<commit_message>
20170812100 - quite stable
</commit_message>
<xml_diff>
--- a/docs/src/main/asciidoc/dist/art/rsrcs.pptx
+++ b/docs/src/main/asciidoc/dist/art/rsrcs.pptx
@@ -10,6 +10,9 @@
     <p:sldId id="259" r:id="rId4"/>
     <p:sldId id="258" r:id="rId5"/>
     <p:sldId id="260" r:id="rId6"/>
+    <p:sldId id="261" r:id="rId7"/>
+    <p:sldId id="262" r:id="rId8"/>
+    <p:sldId id="263" r:id="rId9"/>
   </p:sldIdLst>
   <p:sldSz cx="9144000" cy="6858000" type="screen4x3"/>
   <p:notesSz cx="6858000" cy="9144000"/>
@@ -4578,6 +4581,972 @@
 </p:sld>
 </file>
 
+<file path=ppt/slides/slide6.xml><?xml version="1.0" encoding="utf-8"?>
+<p:sld xmlns:a="http://schemas.openxmlformats.org/drawingml/2006/main" xmlns:r="http://schemas.openxmlformats.org/officeDocument/2006/relationships" xmlns:p="http://schemas.openxmlformats.org/presentationml/2006/main">
+  <p:cSld>
+    <p:spTree>
+      <p:nvGrpSpPr>
+        <p:cNvPr id="1" name=""/>
+        <p:cNvGrpSpPr/>
+        <p:nvPr/>
+      </p:nvGrpSpPr>
+      <p:grpSpPr>
+        <a:xfrm>
+          <a:off x="0" y="0"/>
+          <a:ext cx="0" cy="0"/>
+          <a:chOff x="0" y="0"/>
+          <a:chExt cx="0" cy="0"/>
+        </a:xfrm>
+      </p:grpSpPr>
+      <p:pic>
+        <p:nvPicPr>
+          <p:cNvPr id="4" name="Picture 2" descr="C:\ESPD-EDM-02.00.00-asciidoc\espd-data-model\docs\src\main\asciidoc\images\PaymentOfTaxes_CA_mock-up.png"/>
+          <p:cNvPicPr>
+            <a:picLocks noChangeAspect="1" noChangeArrowheads="1"/>
+          </p:cNvPicPr>
+          <p:nvPr/>
+        </p:nvPicPr>
+        <p:blipFill>
+          <a:blip r:embed="rId2">
+            <a:extLst>
+              <a:ext uri="{28A0092B-C50C-407E-A947-70E740481C1C}">
+                <a14:useLocalDpi xmlns:a14="http://schemas.microsoft.com/office/drawing/2010/main" val="0"/>
+              </a:ext>
+            </a:extLst>
+          </a:blip>
+          <a:srcRect/>
+          <a:stretch>
+            <a:fillRect/>
+          </a:stretch>
+        </p:blipFill>
+        <p:spPr bwMode="auto">
+          <a:xfrm>
+            <a:off x="-1836712" y="610922"/>
+            <a:ext cx="11687175" cy="6238875"/>
+          </a:xfrm>
+          <a:prstGeom prst="rect">
+            <a:avLst/>
+          </a:prstGeom>
+          <a:noFill/>
+          <a:extLst>
+            <a:ext uri="{909E8E84-426E-40DD-AFC4-6F175D3DCCD1}">
+              <a14:hiddenFill xmlns:a14="http://schemas.microsoft.com/office/drawing/2010/main">
+                <a:solidFill>
+                  <a:srgbClr val="FFFFFF"/>
+                </a:solidFill>
+              </a14:hiddenFill>
+            </a:ext>
+          </a:extLst>
+        </p:spPr>
+      </p:pic>
+      <p:sp>
+        <p:nvSpPr>
+          <p:cNvPr id="5" name="4 Rectángulo redondeado"/>
+          <p:cNvSpPr/>
+          <p:nvPr/>
+        </p:nvSpPr>
+        <p:spPr>
+          <a:xfrm>
+            <a:off x="-1791274" y="1804944"/>
+            <a:ext cx="11600604" cy="496742"/>
+          </a:xfrm>
+          <a:prstGeom prst="roundRect">
+            <a:avLst/>
+          </a:prstGeom>
+          <a:noFill/>
+          <a:ln>
+            <a:solidFill>
+              <a:srgbClr val="92D050"/>
+            </a:solidFill>
+            <a:prstDash val="sysDash"/>
+          </a:ln>
+        </p:spPr>
+        <p:style>
+          <a:lnRef idx="2">
+            <a:schemeClr val="accent1">
+              <a:shade val="50000"/>
+            </a:schemeClr>
+          </a:lnRef>
+          <a:fillRef idx="1">
+            <a:schemeClr val="accent1"/>
+          </a:fillRef>
+          <a:effectRef idx="0">
+            <a:schemeClr val="accent1"/>
+          </a:effectRef>
+          <a:fontRef idx="minor">
+            <a:schemeClr val="lt1"/>
+          </a:fontRef>
+        </p:style>
+        <p:txBody>
+          <a:bodyPr rtlCol="0" anchor="ctr"/>
+          <a:lstStyle/>
+          <a:p>
+            <a:pPr algn="ctr"/>
+            <a:endParaRPr lang="en-GB"/>
+          </a:p>
+        </p:txBody>
+      </p:sp>
+      <p:sp>
+        <p:nvSpPr>
+          <p:cNvPr id="6" name="5 CuadroTexto"/>
+          <p:cNvSpPr txBox="1"/>
+          <p:nvPr/>
+        </p:nvSpPr>
+        <p:spPr>
+          <a:xfrm>
+            <a:off x="9900592" y="1844824"/>
+            <a:ext cx="1747466" cy="369332"/>
+          </a:xfrm>
+          <a:prstGeom prst="rect">
+            <a:avLst/>
+          </a:prstGeom>
+          <a:noFill/>
+        </p:spPr>
+        <p:txBody>
+          <a:bodyPr wrap="none" rtlCol="0">
+            <a:spAutoFit/>
+          </a:bodyPr>
+          <a:lstStyle/>
+          <a:p>
+            <a:r>
+              <a:rPr lang="en-GB" b="1" dirty="0" smtClean="0">
+                <a:solidFill>
+                  <a:srgbClr val="00B050"/>
+                </a:solidFill>
+              </a:rPr>
+              <a:t>EU </a:t>
+            </a:r>
+            <a:r>
+              <a:rPr lang="en-GB" b="1" dirty="0" err="1" smtClean="0">
+                <a:solidFill>
+                  <a:srgbClr val="00B050"/>
+                </a:solidFill>
+              </a:rPr>
+              <a:t>PoT</a:t>
+            </a:r>
+            <a:r>
+              <a:rPr lang="en-GB" b="1" dirty="0" smtClean="0">
+                <a:solidFill>
+                  <a:srgbClr val="00B050"/>
+                </a:solidFill>
+              </a:rPr>
+              <a:t> Criterion</a:t>
+            </a:r>
+            <a:endParaRPr lang="en-GB" b="1" dirty="0">
+              <a:solidFill>
+                <a:srgbClr val="00B050"/>
+              </a:solidFill>
+            </a:endParaRPr>
+          </a:p>
+        </p:txBody>
+      </p:sp>
+      <p:sp>
+        <p:nvSpPr>
+          <p:cNvPr id="7" name="6 Rectángulo redondeado"/>
+          <p:cNvSpPr/>
+          <p:nvPr/>
+        </p:nvSpPr>
+        <p:spPr>
+          <a:xfrm>
+            <a:off x="-1750752" y="2492896"/>
+            <a:ext cx="11600604" cy="864096"/>
+          </a:xfrm>
+          <a:prstGeom prst="roundRect">
+            <a:avLst/>
+          </a:prstGeom>
+          <a:noFill/>
+          <a:ln>
+            <a:solidFill>
+              <a:srgbClr val="92D050"/>
+            </a:solidFill>
+            <a:prstDash val="sysDash"/>
+          </a:ln>
+        </p:spPr>
+        <p:style>
+          <a:lnRef idx="2">
+            <a:schemeClr val="accent1">
+              <a:shade val="50000"/>
+            </a:schemeClr>
+          </a:lnRef>
+          <a:fillRef idx="1">
+            <a:schemeClr val="accent1"/>
+          </a:fillRef>
+          <a:effectRef idx="0">
+            <a:schemeClr val="accent1"/>
+          </a:effectRef>
+          <a:fontRef idx="minor">
+            <a:schemeClr val="lt1"/>
+          </a:fontRef>
+        </p:style>
+        <p:txBody>
+          <a:bodyPr rtlCol="0" anchor="ctr"/>
+          <a:lstStyle/>
+          <a:p>
+            <a:pPr algn="ctr"/>
+            <a:endParaRPr lang="en-GB"/>
+          </a:p>
+        </p:txBody>
+      </p:sp>
+      <p:sp>
+        <p:nvSpPr>
+          <p:cNvPr id="8" name="7 CuadroTexto"/>
+          <p:cNvSpPr txBox="1"/>
+          <p:nvPr/>
+        </p:nvSpPr>
+        <p:spPr>
+          <a:xfrm>
+            <a:off x="9864907" y="2728656"/>
+            <a:ext cx="1765099" cy="369332"/>
+          </a:xfrm>
+          <a:prstGeom prst="rect">
+            <a:avLst/>
+          </a:prstGeom>
+          <a:noFill/>
+        </p:spPr>
+        <p:txBody>
+          <a:bodyPr wrap="none" rtlCol="0">
+            <a:spAutoFit/>
+          </a:bodyPr>
+          <a:lstStyle/>
+          <a:p>
+            <a:r>
+              <a:rPr lang="en-GB" b="1" dirty="0" smtClean="0">
+                <a:solidFill>
+                  <a:srgbClr val="00B050"/>
+                </a:solidFill>
+              </a:rPr>
+              <a:t>FI </a:t>
+            </a:r>
+            <a:r>
+              <a:rPr lang="en-GB" b="1" dirty="0" err="1" smtClean="0">
+                <a:solidFill>
+                  <a:srgbClr val="00B050"/>
+                </a:solidFill>
+              </a:rPr>
+              <a:t>PoT</a:t>
+            </a:r>
+            <a:r>
+              <a:rPr lang="en-GB" b="1" dirty="0" smtClean="0">
+                <a:solidFill>
+                  <a:srgbClr val="00B050"/>
+                </a:solidFill>
+              </a:rPr>
+              <a:t> Criterion I</a:t>
+            </a:r>
+            <a:endParaRPr lang="en-GB" b="1" dirty="0">
+              <a:solidFill>
+                <a:srgbClr val="00B050"/>
+              </a:solidFill>
+            </a:endParaRPr>
+          </a:p>
+        </p:txBody>
+      </p:sp>
+      <p:sp>
+        <p:nvSpPr>
+          <p:cNvPr id="9" name="8 Rectángulo redondeado"/>
+          <p:cNvSpPr/>
+          <p:nvPr/>
+        </p:nvSpPr>
+        <p:spPr>
+          <a:xfrm>
+            <a:off x="-1764704" y="3356992"/>
+            <a:ext cx="11600604" cy="1152128"/>
+          </a:xfrm>
+          <a:prstGeom prst="roundRect">
+            <a:avLst/>
+          </a:prstGeom>
+          <a:noFill/>
+          <a:ln>
+            <a:solidFill>
+              <a:srgbClr val="92D050"/>
+            </a:solidFill>
+            <a:prstDash val="sysDash"/>
+          </a:ln>
+        </p:spPr>
+        <p:style>
+          <a:lnRef idx="2">
+            <a:schemeClr val="accent1">
+              <a:shade val="50000"/>
+            </a:schemeClr>
+          </a:lnRef>
+          <a:fillRef idx="1">
+            <a:schemeClr val="accent1"/>
+          </a:fillRef>
+          <a:effectRef idx="0">
+            <a:schemeClr val="accent1"/>
+          </a:effectRef>
+          <a:fontRef idx="minor">
+            <a:schemeClr val="lt1"/>
+          </a:fontRef>
+        </p:style>
+        <p:txBody>
+          <a:bodyPr rtlCol="0" anchor="ctr"/>
+          <a:lstStyle/>
+          <a:p>
+            <a:pPr algn="ctr"/>
+            <a:endParaRPr lang="en-GB"/>
+          </a:p>
+        </p:txBody>
+      </p:sp>
+      <p:sp>
+        <p:nvSpPr>
+          <p:cNvPr id="10" name="9 CuadroTexto"/>
+          <p:cNvSpPr txBox="1"/>
+          <p:nvPr/>
+        </p:nvSpPr>
+        <p:spPr>
+          <a:xfrm>
+            <a:off x="9850955" y="3707740"/>
+            <a:ext cx="1826013" cy="369332"/>
+          </a:xfrm>
+          <a:prstGeom prst="rect">
+            <a:avLst/>
+          </a:prstGeom>
+          <a:noFill/>
+        </p:spPr>
+        <p:txBody>
+          <a:bodyPr wrap="none" rtlCol="0">
+            <a:spAutoFit/>
+          </a:bodyPr>
+          <a:lstStyle/>
+          <a:p>
+            <a:r>
+              <a:rPr lang="en-GB" b="1" dirty="0" smtClean="0">
+                <a:solidFill>
+                  <a:srgbClr val="00B050"/>
+                </a:solidFill>
+              </a:rPr>
+              <a:t>FI </a:t>
+            </a:r>
+            <a:r>
+              <a:rPr lang="en-GB" b="1" dirty="0" err="1" smtClean="0">
+                <a:solidFill>
+                  <a:srgbClr val="00B050"/>
+                </a:solidFill>
+              </a:rPr>
+              <a:t>PoT</a:t>
+            </a:r>
+            <a:r>
+              <a:rPr lang="en-GB" b="1" dirty="0" smtClean="0">
+                <a:solidFill>
+                  <a:srgbClr val="00B050"/>
+                </a:solidFill>
+              </a:rPr>
+              <a:t> Criterion II</a:t>
+            </a:r>
+            <a:endParaRPr lang="en-GB" b="1" dirty="0">
+              <a:solidFill>
+                <a:srgbClr val="00B050"/>
+              </a:solidFill>
+            </a:endParaRPr>
+          </a:p>
+        </p:txBody>
+      </p:sp>
+      <p:sp>
+        <p:nvSpPr>
+          <p:cNvPr id="11" name="10 Rectángulo redondeado"/>
+          <p:cNvSpPr/>
+          <p:nvPr/>
+        </p:nvSpPr>
+        <p:spPr>
+          <a:xfrm>
+            <a:off x="-1764704" y="4509120"/>
+            <a:ext cx="11600604" cy="936104"/>
+          </a:xfrm>
+          <a:prstGeom prst="roundRect">
+            <a:avLst/>
+          </a:prstGeom>
+          <a:noFill/>
+          <a:ln>
+            <a:solidFill>
+              <a:srgbClr val="92D050"/>
+            </a:solidFill>
+            <a:prstDash val="sysDash"/>
+          </a:ln>
+        </p:spPr>
+        <p:style>
+          <a:lnRef idx="2">
+            <a:schemeClr val="accent1">
+              <a:shade val="50000"/>
+            </a:schemeClr>
+          </a:lnRef>
+          <a:fillRef idx="1">
+            <a:schemeClr val="accent1"/>
+          </a:fillRef>
+          <a:effectRef idx="0">
+            <a:schemeClr val="accent1"/>
+          </a:effectRef>
+          <a:fontRef idx="minor">
+            <a:schemeClr val="lt1"/>
+          </a:fontRef>
+        </p:style>
+        <p:txBody>
+          <a:bodyPr rtlCol="0" anchor="ctr"/>
+          <a:lstStyle/>
+          <a:p>
+            <a:pPr algn="ctr"/>
+            <a:endParaRPr lang="en-GB"/>
+          </a:p>
+        </p:txBody>
+      </p:sp>
+      <p:sp>
+        <p:nvSpPr>
+          <p:cNvPr id="12" name="11 CuadroTexto"/>
+          <p:cNvSpPr txBox="1"/>
+          <p:nvPr/>
+        </p:nvSpPr>
+        <p:spPr>
+          <a:xfrm>
+            <a:off x="9850955" y="4753610"/>
+            <a:ext cx="1886927" cy="369332"/>
+          </a:xfrm>
+          <a:prstGeom prst="rect">
+            <a:avLst/>
+          </a:prstGeom>
+          <a:noFill/>
+        </p:spPr>
+        <p:txBody>
+          <a:bodyPr wrap="none" rtlCol="0">
+            <a:spAutoFit/>
+          </a:bodyPr>
+          <a:lstStyle/>
+          <a:p>
+            <a:r>
+              <a:rPr lang="en-GB" b="1" dirty="0" smtClean="0">
+                <a:solidFill>
+                  <a:srgbClr val="00B050"/>
+                </a:solidFill>
+              </a:rPr>
+              <a:t>FI </a:t>
+            </a:r>
+            <a:r>
+              <a:rPr lang="en-GB" b="1" dirty="0" err="1" smtClean="0">
+                <a:solidFill>
+                  <a:srgbClr val="00B050"/>
+                </a:solidFill>
+              </a:rPr>
+              <a:t>PoT</a:t>
+            </a:r>
+            <a:r>
+              <a:rPr lang="en-GB" b="1" dirty="0" smtClean="0">
+                <a:solidFill>
+                  <a:srgbClr val="00B050"/>
+                </a:solidFill>
+              </a:rPr>
+              <a:t> Criterion III</a:t>
+            </a:r>
+            <a:endParaRPr lang="en-GB" b="1" dirty="0">
+              <a:solidFill>
+                <a:srgbClr val="00B050"/>
+              </a:solidFill>
+            </a:endParaRPr>
+          </a:p>
+        </p:txBody>
+      </p:sp>
+      <p:sp>
+        <p:nvSpPr>
+          <p:cNvPr id="13" name="12 Rectángulo redondeado"/>
+          <p:cNvSpPr/>
+          <p:nvPr/>
+        </p:nvSpPr>
+        <p:spPr>
+          <a:xfrm>
+            <a:off x="-1764704" y="5445224"/>
+            <a:ext cx="11600604" cy="1080120"/>
+          </a:xfrm>
+          <a:prstGeom prst="roundRect">
+            <a:avLst/>
+          </a:prstGeom>
+          <a:noFill/>
+          <a:ln>
+            <a:solidFill>
+              <a:srgbClr val="92D050"/>
+            </a:solidFill>
+            <a:prstDash val="sysDash"/>
+          </a:ln>
+        </p:spPr>
+        <p:style>
+          <a:lnRef idx="2">
+            <a:schemeClr val="accent1">
+              <a:shade val="50000"/>
+            </a:schemeClr>
+          </a:lnRef>
+          <a:fillRef idx="1">
+            <a:schemeClr val="accent1"/>
+          </a:fillRef>
+          <a:effectRef idx="0">
+            <a:schemeClr val="accent1"/>
+          </a:effectRef>
+          <a:fontRef idx="minor">
+            <a:schemeClr val="lt1"/>
+          </a:fontRef>
+        </p:style>
+        <p:txBody>
+          <a:bodyPr rtlCol="0" anchor="ctr"/>
+          <a:lstStyle/>
+          <a:p>
+            <a:pPr algn="ctr"/>
+            <a:endParaRPr lang="en-GB"/>
+          </a:p>
+        </p:txBody>
+      </p:sp>
+      <p:sp>
+        <p:nvSpPr>
+          <p:cNvPr id="14" name="13 CuadroTexto"/>
+          <p:cNvSpPr txBox="1"/>
+          <p:nvPr/>
+        </p:nvSpPr>
+        <p:spPr>
+          <a:xfrm>
+            <a:off x="9850955" y="5795972"/>
+            <a:ext cx="1901354" cy="369332"/>
+          </a:xfrm>
+          <a:prstGeom prst="rect">
+            <a:avLst/>
+          </a:prstGeom>
+          <a:noFill/>
+        </p:spPr>
+        <p:txBody>
+          <a:bodyPr wrap="none" rtlCol="0">
+            <a:spAutoFit/>
+          </a:bodyPr>
+          <a:lstStyle/>
+          <a:p>
+            <a:r>
+              <a:rPr lang="en-GB" b="1" dirty="0" smtClean="0">
+                <a:solidFill>
+                  <a:srgbClr val="00B050"/>
+                </a:solidFill>
+              </a:rPr>
+              <a:t>FI </a:t>
+            </a:r>
+            <a:r>
+              <a:rPr lang="en-GB" b="1" dirty="0" err="1" smtClean="0">
+                <a:solidFill>
+                  <a:srgbClr val="00B050"/>
+                </a:solidFill>
+              </a:rPr>
+              <a:t>PoT</a:t>
+            </a:r>
+            <a:r>
+              <a:rPr lang="en-GB" b="1" dirty="0" smtClean="0">
+                <a:solidFill>
+                  <a:srgbClr val="00B050"/>
+                </a:solidFill>
+              </a:rPr>
+              <a:t> Criterion IV</a:t>
+            </a:r>
+            <a:endParaRPr lang="en-GB" b="1" dirty="0">
+              <a:solidFill>
+                <a:srgbClr val="00B050"/>
+              </a:solidFill>
+            </a:endParaRPr>
+          </a:p>
+        </p:txBody>
+      </p:sp>
+    </p:spTree>
+    <p:extLst>
+      <p:ext uri="{BB962C8B-B14F-4D97-AF65-F5344CB8AC3E}">
+        <p14:creationId xmlns:p14="http://schemas.microsoft.com/office/powerpoint/2010/main" val="1792153492"/>
+      </p:ext>
+    </p:extLst>
+  </p:cSld>
+  <p:clrMapOvr>
+    <a:masterClrMapping/>
+  </p:clrMapOvr>
+</p:sld>
+</file>
+
+<file path=ppt/slides/slide7.xml><?xml version="1.0" encoding="utf-8"?>
+<p:sld xmlns:a="http://schemas.openxmlformats.org/drawingml/2006/main" xmlns:r="http://schemas.openxmlformats.org/officeDocument/2006/relationships" xmlns:p="http://schemas.openxmlformats.org/presentationml/2006/main">
+  <p:cSld>
+    <p:spTree>
+      <p:nvGrpSpPr>
+        <p:cNvPr id="1" name=""/>
+        <p:cNvGrpSpPr/>
+        <p:nvPr/>
+      </p:nvGrpSpPr>
+      <p:grpSpPr>
+        <a:xfrm>
+          <a:off x="0" y="0"/>
+          <a:ext cx="0" cy="0"/>
+          <a:chOff x="0" y="0"/>
+          <a:chExt cx="0" cy="0"/>
+        </a:xfrm>
+      </p:grpSpPr>
+      <p:pic>
+        <p:nvPicPr>
+          <p:cNvPr id="1026" name="Picture 2" descr="C:\ESPD-EDM-02.00.00-asciidoc\espd-data-model\docs\src\main\asciidoc\images\PaymentOfTaxes_EO_mock-up.png"/>
+          <p:cNvPicPr>
+            <a:picLocks noChangeAspect="1" noChangeArrowheads="1"/>
+          </p:cNvPicPr>
+          <p:nvPr/>
+        </p:nvPicPr>
+        <p:blipFill>
+          <a:blip r:embed="rId2">
+            <a:extLst>
+              <a:ext uri="{28A0092B-C50C-407E-A947-70E740481C1C}">
+                <a14:useLocalDpi xmlns:a14="http://schemas.microsoft.com/office/drawing/2010/main" val="0"/>
+              </a:ext>
+            </a:extLst>
+          </a:blip>
+          <a:srcRect/>
+          <a:stretch>
+            <a:fillRect/>
+          </a:stretch>
+        </p:blipFill>
+        <p:spPr bwMode="auto">
+          <a:xfrm>
+            <a:off x="-252536" y="116632"/>
+            <a:ext cx="9572625" cy="6029325"/>
+          </a:xfrm>
+          <a:prstGeom prst="rect">
+            <a:avLst/>
+          </a:prstGeom>
+          <a:noFill/>
+          <a:extLst>
+            <a:ext uri="{909E8E84-426E-40DD-AFC4-6F175D3DCCD1}">
+              <a14:hiddenFill xmlns:a14="http://schemas.microsoft.com/office/drawing/2010/main">
+                <a:solidFill>
+                  <a:srgbClr val="FFFFFF"/>
+                </a:solidFill>
+              </a14:hiddenFill>
+            </a:ext>
+          </a:extLst>
+        </p:spPr>
+      </p:pic>
+      <p:sp>
+        <p:nvSpPr>
+          <p:cNvPr id="4" name="3 Rectángulo redondeado"/>
+          <p:cNvSpPr/>
+          <p:nvPr/>
+        </p:nvSpPr>
+        <p:spPr>
+          <a:xfrm>
+            <a:off x="3563888" y="2564904"/>
+            <a:ext cx="5580112" cy="1872208"/>
+          </a:xfrm>
+          <a:prstGeom prst="roundRect">
+            <a:avLst/>
+          </a:prstGeom>
+          <a:noFill/>
+          <a:ln>
+            <a:solidFill>
+              <a:srgbClr val="92D050"/>
+            </a:solidFill>
+            <a:prstDash val="sysDash"/>
+          </a:ln>
+        </p:spPr>
+        <p:style>
+          <a:lnRef idx="2">
+            <a:schemeClr val="accent1">
+              <a:shade val="50000"/>
+            </a:schemeClr>
+          </a:lnRef>
+          <a:fillRef idx="1">
+            <a:schemeClr val="accent1"/>
+          </a:fillRef>
+          <a:effectRef idx="0">
+            <a:schemeClr val="accent1"/>
+          </a:effectRef>
+          <a:fontRef idx="minor">
+            <a:schemeClr val="lt1"/>
+          </a:fontRef>
+        </p:style>
+        <p:txBody>
+          <a:bodyPr rtlCol="0" anchor="ctr"/>
+          <a:lstStyle/>
+          <a:p>
+            <a:pPr algn="ctr"/>
+            <a:endParaRPr lang="en-GB"/>
+          </a:p>
+        </p:txBody>
+      </p:sp>
+      <p:sp>
+        <p:nvSpPr>
+          <p:cNvPr id="5" name="4 CuadroTexto"/>
+          <p:cNvSpPr txBox="1"/>
+          <p:nvPr/>
+        </p:nvSpPr>
+        <p:spPr>
+          <a:xfrm>
+            <a:off x="899592" y="2767073"/>
+            <a:ext cx="2088232" cy="1477328"/>
+          </a:xfrm>
+          <a:prstGeom prst="rect">
+            <a:avLst/>
+          </a:prstGeom>
+          <a:noFill/>
+        </p:spPr>
+        <p:txBody>
+          <a:bodyPr wrap="square" rtlCol="0">
+            <a:spAutoFit/>
+          </a:bodyPr>
+          <a:lstStyle/>
+          <a:p>
+            <a:r>
+              <a:rPr lang="en-GB" dirty="0" smtClean="0">
+                <a:solidFill>
+                  <a:srgbClr val="00B050"/>
+                </a:solidFill>
+              </a:rPr>
+              <a:t>This property is shown only if the answer to the previous QUESTION is ‘Yes’</a:t>
+            </a:r>
+            <a:endParaRPr lang="en-GB" dirty="0">
+              <a:solidFill>
+                <a:srgbClr val="00B050"/>
+              </a:solidFill>
+            </a:endParaRPr>
+          </a:p>
+        </p:txBody>
+      </p:sp>
+      <p:cxnSp>
+        <p:nvCxnSpPr>
+          <p:cNvPr id="7" name="6 Conector recto de flecha"/>
+          <p:cNvCxnSpPr>
+            <a:stCxn id="5" idx="3"/>
+            <a:endCxn id="4" idx="1"/>
+          </p:cNvCxnSpPr>
+          <p:nvPr/>
+        </p:nvCxnSpPr>
+        <p:spPr>
+          <a:xfrm flipV="1">
+            <a:off x="2987824" y="3501008"/>
+            <a:ext cx="576064" cy="4729"/>
+          </a:xfrm>
+          <a:prstGeom prst="straightConnector1">
+            <a:avLst/>
+          </a:prstGeom>
+          <a:ln w="19050">
+            <a:solidFill>
+              <a:srgbClr val="92D050"/>
+            </a:solidFill>
+            <a:tailEnd type="arrow"/>
+          </a:ln>
+        </p:spPr>
+        <p:style>
+          <a:lnRef idx="1">
+            <a:schemeClr val="accent1"/>
+          </a:lnRef>
+          <a:fillRef idx="0">
+            <a:schemeClr val="accent1"/>
+          </a:fillRef>
+          <a:effectRef idx="0">
+            <a:schemeClr val="accent1"/>
+          </a:effectRef>
+          <a:fontRef idx="minor">
+            <a:schemeClr val="tx1"/>
+          </a:fontRef>
+        </p:style>
+      </p:cxnSp>
+    </p:spTree>
+    <p:extLst>
+      <p:ext uri="{BB962C8B-B14F-4D97-AF65-F5344CB8AC3E}">
+        <p14:creationId xmlns:p14="http://schemas.microsoft.com/office/powerpoint/2010/main" val="2606548167"/>
+      </p:ext>
+    </p:extLst>
+  </p:cSld>
+  <p:clrMapOvr>
+    <a:masterClrMapping/>
+  </p:clrMapOvr>
+</p:sld>
+</file>
+
+<file path=ppt/slides/slide8.xml><?xml version="1.0" encoding="utf-8"?>
+<p:sld xmlns:a="http://schemas.openxmlformats.org/drawingml/2006/main" xmlns:r="http://schemas.openxmlformats.org/officeDocument/2006/relationships" xmlns:p="http://schemas.openxmlformats.org/presentationml/2006/main">
+  <p:cSld>
+    <p:spTree>
+      <p:nvGrpSpPr>
+        <p:cNvPr id="1" name=""/>
+        <p:cNvGrpSpPr/>
+        <p:nvPr/>
+      </p:nvGrpSpPr>
+      <p:grpSpPr>
+        <a:xfrm>
+          <a:off x="0" y="0"/>
+          <a:ext cx="0" cy="0"/>
+          <a:chOff x="0" y="0"/>
+          <a:chExt cx="0" cy="0"/>
+        </a:xfrm>
+      </p:grpSpPr>
+      <p:pic>
+        <p:nvPicPr>
+          <p:cNvPr id="2050" name="Picture 2" descr="C:\ESPD-EDM-02.00.00-asciidoc\espd-data-model\docs\src\main\asciidoc\images\PaymentOfTaxes_EO_mock-up-2.png"/>
+          <p:cNvPicPr>
+            <a:picLocks noChangeAspect="1" noChangeArrowheads="1"/>
+          </p:cNvPicPr>
+          <p:nvPr/>
+        </p:nvPicPr>
+        <p:blipFill>
+          <a:blip r:embed="rId2">
+            <a:extLst>
+              <a:ext uri="{28A0092B-C50C-407E-A947-70E740481C1C}">
+                <a14:useLocalDpi xmlns:a14="http://schemas.microsoft.com/office/drawing/2010/main" val="0"/>
+              </a:ext>
+            </a:extLst>
+          </a:blip>
+          <a:srcRect/>
+          <a:stretch>
+            <a:fillRect/>
+          </a:stretch>
+        </p:blipFill>
+        <p:spPr bwMode="auto">
+          <a:xfrm>
+            <a:off x="438025" y="404664"/>
+            <a:ext cx="8526463" cy="5610225"/>
+          </a:xfrm>
+          <a:prstGeom prst="rect">
+            <a:avLst/>
+          </a:prstGeom>
+          <a:noFill/>
+          <a:extLst>
+            <a:ext uri="{909E8E84-426E-40DD-AFC4-6F175D3DCCD1}">
+              <a14:hiddenFill xmlns:a14="http://schemas.microsoft.com/office/drawing/2010/main">
+                <a:solidFill>
+                  <a:srgbClr val="FFFFFF"/>
+                </a:solidFill>
+              </a14:hiddenFill>
+            </a:ext>
+          </a:extLst>
+        </p:spPr>
+      </p:pic>
+      <p:sp>
+        <p:nvSpPr>
+          <p:cNvPr id="4" name="3 Rectángulo redondeado"/>
+          <p:cNvSpPr/>
+          <p:nvPr/>
+        </p:nvSpPr>
+        <p:spPr>
+          <a:xfrm>
+            <a:off x="3779912" y="2564904"/>
+            <a:ext cx="5184576" cy="1872208"/>
+          </a:xfrm>
+          <a:prstGeom prst="roundRect">
+            <a:avLst/>
+          </a:prstGeom>
+          <a:noFill/>
+          <a:ln>
+            <a:solidFill>
+              <a:srgbClr val="92D050"/>
+            </a:solidFill>
+            <a:prstDash val="sysDash"/>
+          </a:ln>
+        </p:spPr>
+        <p:style>
+          <a:lnRef idx="2">
+            <a:schemeClr val="accent1">
+              <a:shade val="50000"/>
+            </a:schemeClr>
+          </a:lnRef>
+          <a:fillRef idx="1">
+            <a:schemeClr val="accent1"/>
+          </a:fillRef>
+          <a:effectRef idx="0">
+            <a:schemeClr val="accent1"/>
+          </a:effectRef>
+          <a:fontRef idx="minor">
+            <a:schemeClr val="lt1"/>
+          </a:fontRef>
+        </p:style>
+        <p:txBody>
+          <a:bodyPr rtlCol="0" anchor="ctr"/>
+          <a:lstStyle/>
+          <a:p>
+            <a:pPr algn="ctr"/>
+            <a:endParaRPr lang="en-GB"/>
+          </a:p>
+        </p:txBody>
+      </p:sp>
+      <p:sp>
+        <p:nvSpPr>
+          <p:cNvPr id="5" name="4 CuadroTexto"/>
+          <p:cNvSpPr txBox="1"/>
+          <p:nvPr/>
+        </p:nvSpPr>
+        <p:spPr>
+          <a:xfrm>
+            <a:off x="1301387" y="2764340"/>
+            <a:ext cx="2088232" cy="1477328"/>
+          </a:xfrm>
+          <a:prstGeom prst="rect">
+            <a:avLst/>
+          </a:prstGeom>
+          <a:noFill/>
+        </p:spPr>
+        <p:txBody>
+          <a:bodyPr wrap="square" rtlCol="0">
+            <a:spAutoFit/>
+          </a:bodyPr>
+          <a:lstStyle/>
+          <a:p>
+            <a:r>
+              <a:rPr lang="en-GB" dirty="0" smtClean="0">
+                <a:solidFill>
+                  <a:srgbClr val="00B050"/>
+                </a:solidFill>
+              </a:rPr>
+              <a:t>This group of property is shown only if the answer to the previous QUESTION is ‘No’</a:t>
+            </a:r>
+            <a:endParaRPr lang="en-GB" dirty="0">
+              <a:solidFill>
+                <a:srgbClr val="00B050"/>
+              </a:solidFill>
+            </a:endParaRPr>
+          </a:p>
+        </p:txBody>
+      </p:sp>
+      <p:cxnSp>
+        <p:nvCxnSpPr>
+          <p:cNvPr id="7" name="6 Conector recto de flecha"/>
+          <p:cNvCxnSpPr>
+            <a:stCxn id="5" idx="3"/>
+            <a:endCxn id="4" idx="1"/>
+          </p:cNvCxnSpPr>
+          <p:nvPr/>
+        </p:nvCxnSpPr>
+        <p:spPr>
+          <a:xfrm flipV="1">
+            <a:off x="3389619" y="3501008"/>
+            <a:ext cx="390293" cy="1996"/>
+          </a:xfrm>
+          <a:prstGeom prst="straightConnector1">
+            <a:avLst/>
+          </a:prstGeom>
+          <a:ln w="19050">
+            <a:solidFill>
+              <a:srgbClr val="92D050"/>
+            </a:solidFill>
+            <a:tailEnd type="arrow"/>
+          </a:ln>
+        </p:spPr>
+        <p:style>
+          <a:lnRef idx="1">
+            <a:schemeClr val="accent1"/>
+          </a:lnRef>
+          <a:fillRef idx="0">
+            <a:schemeClr val="accent1"/>
+          </a:fillRef>
+          <a:effectRef idx="0">
+            <a:schemeClr val="accent1"/>
+          </a:effectRef>
+          <a:fontRef idx="minor">
+            <a:schemeClr val="tx1"/>
+          </a:fontRef>
+        </p:style>
+      </p:cxnSp>
+    </p:spTree>
+    <p:extLst>
+      <p:ext uri="{BB962C8B-B14F-4D97-AF65-F5344CB8AC3E}">
+        <p14:creationId xmlns:p14="http://schemas.microsoft.com/office/powerpoint/2010/main" val="3249331159"/>
+      </p:ext>
+    </p:extLst>
+  </p:cSld>
+  <p:clrMapOvr>
+    <a:masterClrMapping/>
+  </p:clrMapOvr>
+</p:sld>
+</file>
+
 <file path=ppt/theme/theme1.xml><?xml version="1.0" encoding="utf-8"?>
 <a:theme xmlns:a="http://schemas.openxmlformats.org/drawingml/2006/main" name="Tema de Office">
   <a:themeElements>

</xml_diff>

<commit_message>
20170805 - Bullets all over
</commit_message>
<xml_diff>
--- a/docs/src/main/asciidoc/dist/art/rsrcs.pptx
+++ b/docs/src/main/asciidoc/dist/art/rsrcs.pptx
@@ -10,9 +10,12 @@
     <p:sldId id="259" r:id="rId4"/>
     <p:sldId id="258" r:id="rId5"/>
     <p:sldId id="260" r:id="rId6"/>
-    <p:sldId id="261" r:id="rId7"/>
-    <p:sldId id="262" r:id="rId8"/>
-    <p:sldId id="263" r:id="rId9"/>
+    <p:sldId id="265" r:id="rId7"/>
+    <p:sldId id="261" r:id="rId8"/>
+    <p:sldId id="262" r:id="rId9"/>
+    <p:sldId id="263" r:id="rId10"/>
+    <p:sldId id="266" r:id="rId11"/>
+    <p:sldId id="264" r:id="rId12"/>
   </p:sldIdLst>
   <p:sldSz cx="9144000" cy="6858000" type="screen4x3"/>
   <p:notesSz cx="6858000" cy="9144000"/>
@@ -295,7 +298,7 @@
           <a:p>
             <a:fld id="{DEB85D80-9F65-433D-8644-C8D18C3CFA99}" type="datetimeFigureOut">
               <a:rPr lang="en-GB" smtClean="0"/>
-              <a:t>01/08/2017</a:t>
+              <a:t>05/08/2017</a:t>
             </a:fld>
             <a:endParaRPr lang="en-GB"/>
           </a:p>
@@ -465,7 +468,7 @@
           <a:p>
             <a:fld id="{DEB85D80-9F65-433D-8644-C8D18C3CFA99}" type="datetimeFigureOut">
               <a:rPr lang="en-GB" smtClean="0"/>
-              <a:t>01/08/2017</a:t>
+              <a:t>05/08/2017</a:t>
             </a:fld>
             <a:endParaRPr lang="en-GB"/>
           </a:p>
@@ -645,7 +648,7 @@
           <a:p>
             <a:fld id="{DEB85D80-9F65-433D-8644-C8D18C3CFA99}" type="datetimeFigureOut">
               <a:rPr lang="en-GB" smtClean="0"/>
-              <a:t>01/08/2017</a:t>
+              <a:t>05/08/2017</a:t>
             </a:fld>
             <a:endParaRPr lang="en-GB"/>
           </a:p>
@@ -815,7 +818,7 @@
           <a:p>
             <a:fld id="{DEB85D80-9F65-433D-8644-C8D18C3CFA99}" type="datetimeFigureOut">
               <a:rPr lang="en-GB" smtClean="0"/>
-              <a:t>01/08/2017</a:t>
+              <a:t>05/08/2017</a:t>
             </a:fld>
             <a:endParaRPr lang="en-GB"/>
           </a:p>
@@ -1061,7 +1064,7 @@
           <a:p>
             <a:fld id="{DEB85D80-9F65-433D-8644-C8D18C3CFA99}" type="datetimeFigureOut">
               <a:rPr lang="en-GB" smtClean="0"/>
-              <a:t>01/08/2017</a:t>
+              <a:t>05/08/2017</a:t>
             </a:fld>
             <a:endParaRPr lang="en-GB"/>
           </a:p>
@@ -1349,7 +1352,7 @@
           <a:p>
             <a:fld id="{DEB85D80-9F65-433D-8644-C8D18C3CFA99}" type="datetimeFigureOut">
               <a:rPr lang="en-GB" smtClean="0"/>
-              <a:t>01/08/2017</a:t>
+              <a:t>05/08/2017</a:t>
             </a:fld>
             <a:endParaRPr lang="en-GB"/>
           </a:p>
@@ -1771,7 +1774,7 @@
           <a:p>
             <a:fld id="{DEB85D80-9F65-433D-8644-C8D18C3CFA99}" type="datetimeFigureOut">
               <a:rPr lang="en-GB" smtClean="0"/>
-              <a:t>01/08/2017</a:t>
+              <a:t>05/08/2017</a:t>
             </a:fld>
             <a:endParaRPr lang="en-GB"/>
           </a:p>
@@ -1889,7 +1892,7 @@
           <a:p>
             <a:fld id="{DEB85D80-9F65-433D-8644-C8D18C3CFA99}" type="datetimeFigureOut">
               <a:rPr lang="en-GB" smtClean="0"/>
-              <a:t>01/08/2017</a:t>
+              <a:t>05/08/2017</a:t>
             </a:fld>
             <a:endParaRPr lang="en-GB"/>
           </a:p>
@@ -1984,7 +1987,7 @@
           <a:p>
             <a:fld id="{DEB85D80-9F65-433D-8644-C8D18C3CFA99}" type="datetimeFigureOut">
               <a:rPr lang="en-GB" smtClean="0"/>
-              <a:t>01/08/2017</a:t>
+              <a:t>05/08/2017</a:t>
             </a:fld>
             <a:endParaRPr lang="en-GB"/>
           </a:p>
@@ -2261,7 +2264,7 @@
           <a:p>
             <a:fld id="{DEB85D80-9F65-433D-8644-C8D18C3CFA99}" type="datetimeFigureOut">
               <a:rPr lang="en-GB" smtClean="0"/>
-              <a:t>01/08/2017</a:t>
+              <a:t>05/08/2017</a:t>
             </a:fld>
             <a:endParaRPr lang="en-GB"/>
           </a:p>
@@ -2514,7 +2517,7 @@
           <a:p>
             <a:fld id="{DEB85D80-9F65-433D-8644-C8D18C3CFA99}" type="datetimeFigureOut">
               <a:rPr lang="en-GB" smtClean="0"/>
-              <a:t>01/08/2017</a:t>
+              <a:t>05/08/2017</a:t>
             </a:fld>
             <a:endParaRPr lang="en-GB"/>
           </a:p>
@@ -2727,7 +2730,7 @@
           <a:p>
             <a:fld id="{DEB85D80-9F65-433D-8644-C8D18C3CFA99}" type="datetimeFigureOut">
               <a:rPr lang="en-GB" smtClean="0"/>
-              <a:t>01/08/2017</a:t>
+              <a:t>05/08/2017</a:t>
             </a:fld>
             <a:endParaRPr lang="en-GB"/>
           </a:p>
@@ -3203,6 +3206,672 @@
 </p:sld>
 </file>
 
+<file path=ppt/slides/slide10.xml><?xml version="1.0" encoding="utf-8"?>
+<p:sld xmlns:a="http://schemas.openxmlformats.org/drawingml/2006/main" xmlns:r="http://schemas.openxmlformats.org/officeDocument/2006/relationships" xmlns:p="http://schemas.openxmlformats.org/presentationml/2006/main">
+  <p:cSld>
+    <p:spTree>
+      <p:nvGrpSpPr>
+        <p:cNvPr id="1" name=""/>
+        <p:cNvGrpSpPr/>
+        <p:nvPr/>
+      </p:nvGrpSpPr>
+      <p:grpSpPr>
+        <a:xfrm>
+          <a:off x="0" y="0"/>
+          <a:ext cx="0" cy="0"/>
+          <a:chOff x="0" y="0"/>
+          <a:chExt cx="0" cy="0"/>
+        </a:xfrm>
+      </p:grpSpPr>
+      <p:pic>
+        <p:nvPicPr>
+          <p:cNvPr id="1028" name="Picture 4"/>
+          <p:cNvPicPr>
+            <a:picLocks noChangeAspect="1" noChangeArrowheads="1"/>
+          </p:cNvPicPr>
+          <p:nvPr/>
+        </p:nvPicPr>
+        <p:blipFill>
+          <a:blip r:embed="rId2">
+            <a:extLst>
+              <a:ext uri="{28A0092B-C50C-407E-A947-70E740481C1C}">
+                <a14:useLocalDpi xmlns:a14="http://schemas.microsoft.com/office/drawing/2010/main" val="0"/>
+              </a:ext>
+            </a:extLst>
+          </a:blip>
+          <a:srcRect/>
+          <a:stretch>
+            <a:fillRect/>
+          </a:stretch>
+        </p:blipFill>
+        <p:spPr bwMode="auto">
+          <a:xfrm>
+            <a:off x="20006" y="5752"/>
+            <a:ext cx="9839325" cy="9963150"/>
+          </a:xfrm>
+          <a:prstGeom prst="rect">
+            <a:avLst/>
+          </a:prstGeom>
+          <a:noFill/>
+          <a:ln>
+            <a:noFill/>
+          </a:ln>
+          <a:extLst>
+            <a:ext uri="{909E8E84-426E-40DD-AFC4-6F175D3DCCD1}">
+              <a14:hiddenFill xmlns:a14="http://schemas.microsoft.com/office/drawing/2010/main">
+                <a:solidFill>
+                  <a:schemeClr val="accent1"/>
+                </a:solidFill>
+              </a14:hiddenFill>
+            </a:ext>
+            <a:ext uri="{91240B29-F687-4F45-9708-019B960494DF}">
+              <a14:hiddenLine xmlns:a14="http://schemas.microsoft.com/office/drawing/2010/main" w="9525">
+                <a:solidFill>
+                  <a:schemeClr val="tx1"/>
+                </a:solidFill>
+                <a:miter lim="800000"/>
+                <a:headEnd/>
+                <a:tailEnd/>
+              </a14:hiddenLine>
+            </a:ext>
+          </a:extLst>
+        </p:spPr>
+      </p:pic>
+      <p:sp>
+        <p:nvSpPr>
+          <p:cNvPr id="3" name="2 Elipse"/>
+          <p:cNvSpPr/>
+          <p:nvPr/>
+        </p:nvSpPr>
+        <p:spPr>
+          <a:xfrm>
+            <a:off x="2822151" y="3429000"/>
+            <a:ext cx="237681" cy="223557"/>
+          </a:xfrm>
+          <a:prstGeom prst="ellipse">
+            <a:avLst/>
+          </a:prstGeom>
+          <a:solidFill>
+            <a:srgbClr val="0070C0"/>
+          </a:solidFill>
+          <a:ln>
+            <a:noFill/>
+          </a:ln>
+        </p:spPr>
+        <p:style>
+          <a:lnRef idx="2">
+            <a:schemeClr val="accent1">
+              <a:shade val="50000"/>
+            </a:schemeClr>
+          </a:lnRef>
+          <a:fillRef idx="1">
+            <a:schemeClr val="accent1"/>
+          </a:fillRef>
+          <a:effectRef idx="0">
+            <a:schemeClr val="accent1"/>
+          </a:effectRef>
+          <a:fontRef idx="minor">
+            <a:schemeClr val="lt1"/>
+          </a:fontRef>
+        </p:style>
+        <p:txBody>
+          <a:bodyPr rtlCol="0" anchor="ctr"/>
+          <a:lstStyle/>
+          <a:p>
+            <a:pPr algn="ctr"/>
+            <a:r>
+              <a:rPr lang="en-GB" sz="1200" dirty="0" smtClean="0"/>
+              <a:t>1</a:t>
+            </a:r>
+            <a:endParaRPr lang="en-GB" sz="1200" dirty="0"/>
+          </a:p>
+        </p:txBody>
+      </p:sp>
+      <p:sp>
+        <p:nvSpPr>
+          <p:cNvPr id="4" name="3 Elipse"/>
+          <p:cNvSpPr/>
+          <p:nvPr/>
+        </p:nvSpPr>
+        <p:spPr>
+          <a:xfrm>
+            <a:off x="5580112" y="3442648"/>
+            <a:ext cx="237681" cy="223557"/>
+          </a:xfrm>
+          <a:prstGeom prst="ellipse">
+            <a:avLst/>
+          </a:prstGeom>
+          <a:solidFill>
+            <a:srgbClr val="0070C0"/>
+          </a:solidFill>
+          <a:ln>
+            <a:noFill/>
+          </a:ln>
+        </p:spPr>
+        <p:style>
+          <a:lnRef idx="2">
+            <a:schemeClr val="accent1">
+              <a:shade val="50000"/>
+            </a:schemeClr>
+          </a:lnRef>
+          <a:fillRef idx="1">
+            <a:schemeClr val="accent1"/>
+          </a:fillRef>
+          <a:effectRef idx="0">
+            <a:schemeClr val="accent1"/>
+          </a:effectRef>
+          <a:fontRef idx="minor">
+            <a:schemeClr val="lt1"/>
+          </a:fontRef>
+        </p:style>
+        <p:txBody>
+          <a:bodyPr rtlCol="0" anchor="ctr"/>
+          <a:lstStyle/>
+          <a:p>
+            <a:pPr algn="ctr"/>
+            <a:r>
+              <a:rPr lang="en-GB" sz="1200" dirty="0" smtClean="0"/>
+              <a:t>2</a:t>
+            </a:r>
+            <a:endParaRPr lang="en-GB" sz="1200" dirty="0"/>
+          </a:p>
+        </p:txBody>
+      </p:sp>
+      <p:sp>
+        <p:nvSpPr>
+          <p:cNvPr id="5" name="4 Elipse"/>
+          <p:cNvSpPr/>
+          <p:nvPr/>
+        </p:nvSpPr>
+        <p:spPr>
+          <a:xfrm>
+            <a:off x="8236399" y="4645603"/>
+            <a:ext cx="237681" cy="223557"/>
+          </a:xfrm>
+          <a:prstGeom prst="ellipse">
+            <a:avLst/>
+          </a:prstGeom>
+          <a:solidFill>
+            <a:srgbClr val="0070C0"/>
+          </a:solidFill>
+          <a:ln>
+            <a:noFill/>
+          </a:ln>
+        </p:spPr>
+        <p:style>
+          <a:lnRef idx="2">
+            <a:schemeClr val="accent1">
+              <a:shade val="50000"/>
+            </a:schemeClr>
+          </a:lnRef>
+          <a:fillRef idx="1">
+            <a:schemeClr val="accent1"/>
+          </a:fillRef>
+          <a:effectRef idx="0">
+            <a:schemeClr val="accent1"/>
+          </a:effectRef>
+          <a:fontRef idx="minor">
+            <a:schemeClr val="lt1"/>
+          </a:fontRef>
+        </p:style>
+        <p:txBody>
+          <a:bodyPr rtlCol="0" anchor="ctr"/>
+          <a:lstStyle/>
+          <a:p>
+            <a:pPr algn="ctr"/>
+            <a:r>
+              <a:rPr lang="en-GB" sz="1200" dirty="0" smtClean="0"/>
+              <a:t>3</a:t>
+            </a:r>
+            <a:endParaRPr lang="en-GB" sz="1200" dirty="0"/>
+          </a:p>
+        </p:txBody>
+      </p:sp>
+      <p:sp>
+        <p:nvSpPr>
+          <p:cNvPr id="7" name="6 Elipse"/>
+          <p:cNvSpPr/>
+          <p:nvPr/>
+        </p:nvSpPr>
+        <p:spPr>
+          <a:xfrm>
+            <a:off x="2929464" y="7447800"/>
+            <a:ext cx="237681" cy="223557"/>
+          </a:xfrm>
+          <a:prstGeom prst="ellipse">
+            <a:avLst/>
+          </a:prstGeom>
+          <a:solidFill>
+            <a:srgbClr val="0070C0"/>
+          </a:solidFill>
+          <a:ln>
+            <a:noFill/>
+          </a:ln>
+        </p:spPr>
+        <p:style>
+          <a:lnRef idx="2">
+            <a:schemeClr val="accent1">
+              <a:shade val="50000"/>
+            </a:schemeClr>
+          </a:lnRef>
+          <a:fillRef idx="1">
+            <a:schemeClr val="accent1"/>
+          </a:fillRef>
+          <a:effectRef idx="0">
+            <a:schemeClr val="accent1"/>
+          </a:effectRef>
+          <a:fontRef idx="minor">
+            <a:schemeClr val="lt1"/>
+          </a:fontRef>
+        </p:style>
+        <p:txBody>
+          <a:bodyPr rtlCol="0" anchor="ctr"/>
+          <a:lstStyle/>
+          <a:p>
+            <a:pPr algn="ctr"/>
+            <a:r>
+              <a:rPr lang="en-GB" sz="1200" dirty="0" smtClean="0"/>
+              <a:t>1</a:t>
+            </a:r>
+            <a:endParaRPr lang="en-GB" sz="1200" dirty="0"/>
+          </a:p>
+        </p:txBody>
+      </p:sp>
+      <p:sp>
+        <p:nvSpPr>
+          <p:cNvPr id="8" name="7 Elipse"/>
+          <p:cNvSpPr/>
+          <p:nvPr/>
+        </p:nvSpPr>
+        <p:spPr>
+          <a:xfrm>
+            <a:off x="5673777" y="7403088"/>
+            <a:ext cx="237681" cy="223557"/>
+          </a:xfrm>
+          <a:prstGeom prst="ellipse">
+            <a:avLst/>
+          </a:prstGeom>
+          <a:solidFill>
+            <a:srgbClr val="0070C0"/>
+          </a:solidFill>
+          <a:ln>
+            <a:noFill/>
+          </a:ln>
+        </p:spPr>
+        <p:style>
+          <a:lnRef idx="2">
+            <a:schemeClr val="accent1">
+              <a:shade val="50000"/>
+            </a:schemeClr>
+          </a:lnRef>
+          <a:fillRef idx="1">
+            <a:schemeClr val="accent1"/>
+          </a:fillRef>
+          <a:effectRef idx="0">
+            <a:schemeClr val="accent1"/>
+          </a:effectRef>
+          <a:fontRef idx="minor">
+            <a:schemeClr val="lt1"/>
+          </a:fontRef>
+        </p:style>
+        <p:txBody>
+          <a:bodyPr rtlCol="0" anchor="ctr"/>
+          <a:lstStyle/>
+          <a:p>
+            <a:pPr algn="ctr"/>
+            <a:r>
+              <a:rPr lang="en-GB" sz="1200" dirty="0" smtClean="0"/>
+              <a:t>2</a:t>
+            </a:r>
+            <a:endParaRPr lang="en-GB" sz="1200" dirty="0"/>
+          </a:p>
+        </p:txBody>
+      </p:sp>
+      <p:sp>
+        <p:nvSpPr>
+          <p:cNvPr id="9" name="8 Elipse"/>
+          <p:cNvSpPr/>
+          <p:nvPr/>
+        </p:nvSpPr>
+        <p:spPr>
+          <a:xfrm>
+            <a:off x="8343712" y="8664403"/>
+            <a:ext cx="237681" cy="223557"/>
+          </a:xfrm>
+          <a:prstGeom prst="ellipse">
+            <a:avLst/>
+          </a:prstGeom>
+          <a:solidFill>
+            <a:srgbClr val="0070C0"/>
+          </a:solidFill>
+          <a:ln>
+            <a:noFill/>
+          </a:ln>
+        </p:spPr>
+        <p:style>
+          <a:lnRef idx="2">
+            <a:schemeClr val="accent1">
+              <a:shade val="50000"/>
+            </a:schemeClr>
+          </a:lnRef>
+          <a:fillRef idx="1">
+            <a:schemeClr val="accent1"/>
+          </a:fillRef>
+          <a:effectRef idx="0">
+            <a:schemeClr val="accent1"/>
+          </a:effectRef>
+          <a:fontRef idx="minor">
+            <a:schemeClr val="lt1"/>
+          </a:fontRef>
+        </p:style>
+        <p:txBody>
+          <a:bodyPr rtlCol="0" anchor="ctr"/>
+          <a:lstStyle/>
+          <a:p>
+            <a:pPr algn="ctr"/>
+            <a:r>
+              <a:rPr lang="en-GB" sz="1200" dirty="0" smtClean="0"/>
+              <a:t>3</a:t>
+            </a:r>
+            <a:endParaRPr lang="en-GB" sz="1200" dirty="0"/>
+          </a:p>
+        </p:txBody>
+      </p:sp>
+    </p:spTree>
+    <p:extLst>
+      <p:ext uri="{BB962C8B-B14F-4D97-AF65-F5344CB8AC3E}">
+        <p14:creationId xmlns:p14="http://schemas.microsoft.com/office/powerpoint/2010/main" val="3114209087"/>
+      </p:ext>
+    </p:extLst>
+  </p:cSld>
+  <p:clrMapOvr>
+    <a:masterClrMapping/>
+  </p:clrMapOvr>
+</p:sld>
+</file>
+
+<file path=ppt/slides/slide11.xml><?xml version="1.0" encoding="utf-8"?>
+<p:sld xmlns:a="http://schemas.openxmlformats.org/drawingml/2006/main" xmlns:r="http://schemas.openxmlformats.org/officeDocument/2006/relationships" xmlns:p="http://schemas.openxmlformats.org/presentationml/2006/main">
+  <p:cSld>
+    <p:spTree>
+      <p:nvGrpSpPr>
+        <p:cNvPr id="1" name=""/>
+        <p:cNvGrpSpPr/>
+        <p:nvPr/>
+      </p:nvGrpSpPr>
+      <p:grpSpPr>
+        <a:xfrm>
+          <a:off x="0" y="0"/>
+          <a:ext cx="0" cy="0"/>
+          <a:chOff x="0" y="0"/>
+          <a:chExt cx="0" cy="0"/>
+        </a:xfrm>
+      </p:grpSpPr>
+      <p:pic>
+        <p:nvPicPr>
+          <p:cNvPr id="1026" name="Picture 2" descr="C:\ESPD-EDM-02.00.00-asciidoc\espd-data-model\docs\src\main\asciidoc\images\PaymentOfTaxes_EO_mock-up.png"/>
+          <p:cNvPicPr>
+            <a:picLocks noChangeAspect="1" noChangeArrowheads="1"/>
+          </p:cNvPicPr>
+          <p:nvPr/>
+        </p:nvPicPr>
+        <p:blipFill>
+          <a:blip r:embed="rId2">
+            <a:extLst>
+              <a:ext uri="{28A0092B-C50C-407E-A947-70E740481C1C}">
+                <a14:useLocalDpi xmlns:a14="http://schemas.microsoft.com/office/drawing/2010/main" val="0"/>
+              </a:ext>
+            </a:extLst>
+          </a:blip>
+          <a:srcRect/>
+          <a:stretch>
+            <a:fillRect/>
+          </a:stretch>
+        </p:blipFill>
+        <p:spPr bwMode="auto">
+          <a:xfrm>
+            <a:off x="-251467" y="116632"/>
+            <a:ext cx="9572625" cy="6029325"/>
+          </a:xfrm>
+          <a:prstGeom prst="rect">
+            <a:avLst/>
+          </a:prstGeom>
+          <a:noFill/>
+          <a:extLst>
+            <a:ext uri="{909E8E84-426E-40DD-AFC4-6F175D3DCCD1}">
+              <a14:hiddenFill xmlns:a14="http://schemas.microsoft.com/office/drawing/2010/main">
+                <a:solidFill>
+                  <a:srgbClr val="FFFFFF"/>
+                </a:solidFill>
+              </a14:hiddenFill>
+            </a:ext>
+          </a:extLst>
+        </p:spPr>
+      </p:pic>
+      <p:sp>
+        <p:nvSpPr>
+          <p:cNvPr id="2" name="1 CuadroTexto"/>
+          <p:cNvSpPr txBox="1"/>
+          <p:nvPr/>
+        </p:nvSpPr>
+        <p:spPr>
+          <a:xfrm>
+            <a:off x="-88471" y="2114272"/>
+            <a:ext cx="3724367" cy="738664"/>
+          </a:xfrm>
+          <a:prstGeom prst="rect">
+            <a:avLst/>
+          </a:prstGeom>
+          <a:noFill/>
+        </p:spPr>
+        <p:txBody>
+          <a:bodyPr wrap="square" rtlCol="0">
+            <a:spAutoFit/>
+          </a:bodyPr>
+          <a:lstStyle/>
+          <a:p>
+            <a:r>
+              <a:rPr lang="en-GB" sz="1400" b="1" dirty="0" smtClean="0">
+                <a:solidFill>
+                  <a:schemeClr val="accent1">
+                    <a:lumMod val="75000"/>
+                  </a:schemeClr>
+                </a:solidFill>
+              </a:rPr>
+              <a:t>Minimum threshold</a:t>
+            </a:r>
+            <a:r>
+              <a:rPr lang="en-GB" sz="1400" dirty="0" smtClean="0">
+                <a:solidFill>
+                  <a:schemeClr val="accent1">
+                    <a:lumMod val="75000"/>
+                  </a:schemeClr>
+                </a:solidFill>
+              </a:rPr>
+              <a:t>:  50€</a:t>
+            </a:r>
+          </a:p>
+          <a:p>
+            <a:r>
+              <a:rPr lang="en-GB" sz="1400" b="1" dirty="0" smtClean="0">
+                <a:solidFill>
+                  <a:schemeClr val="accent1">
+                    <a:lumMod val="75000"/>
+                  </a:schemeClr>
+                </a:solidFill>
+              </a:rPr>
+              <a:t>In case of debt please try to fulfil your obligation before tendering</a:t>
+            </a:r>
+            <a:endParaRPr lang="en-GB" sz="1400" b="1" dirty="0">
+              <a:solidFill>
+                <a:schemeClr val="accent1">
+                  <a:lumMod val="75000"/>
+                </a:schemeClr>
+              </a:solidFill>
+            </a:endParaRPr>
+          </a:p>
+        </p:txBody>
+      </p:sp>
+      <p:sp>
+        <p:nvSpPr>
+          <p:cNvPr id="8" name="7 Elipse"/>
+          <p:cNvSpPr/>
+          <p:nvPr/>
+        </p:nvSpPr>
+        <p:spPr>
+          <a:xfrm>
+            <a:off x="-346865" y="2132856"/>
+            <a:ext cx="237681" cy="223557"/>
+          </a:xfrm>
+          <a:prstGeom prst="ellipse">
+            <a:avLst/>
+          </a:prstGeom>
+          <a:solidFill>
+            <a:srgbClr val="0070C0"/>
+          </a:solidFill>
+          <a:ln>
+            <a:noFill/>
+          </a:ln>
+        </p:spPr>
+        <p:style>
+          <a:lnRef idx="2">
+            <a:schemeClr val="accent1">
+              <a:shade val="50000"/>
+            </a:schemeClr>
+          </a:lnRef>
+          <a:fillRef idx="1">
+            <a:schemeClr val="accent1"/>
+          </a:fillRef>
+          <a:effectRef idx="0">
+            <a:schemeClr val="accent1"/>
+          </a:effectRef>
+          <a:fontRef idx="minor">
+            <a:schemeClr val="lt1"/>
+          </a:fontRef>
+        </p:style>
+        <p:txBody>
+          <a:bodyPr rtlCol="0" anchor="ctr"/>
+          <a:lstStyle/>
+          <a:p>
+            <a:pPr algn="ctr"/>
+            <a:r>
+              <a:rPr lang="en-GB" sz="1200" dirty="0" smtClean="0"/>
+              <a:t>1</a:t>
+            </a:r>
+            <a:endParaRPr lang="en-GB" sz="1200" dirty="0"/>
+          </a:p>
+        </p:txBody>
+      </p:sp>
+      <p:sp>
+        <p:nvSpPr>
+          <p:cNvPr id="10" name="9 Elipse"/>
+          <p:cNvSpPr/>
+          <p:nvPr/>
+        </p:nvSpPr>
+        <p:spPr>
+          <a:xfrm>
+            <a:off x="-338192" y="2485363"/>
+            <a:ext cx="237681" cy="223557"/>
+          </a:xfrm>
+          <a:prstGeom prst="ellipse">
+            <a:avLst/>
+          </a:prstGeom>
+          <a:solidFill>
+            <a:srgbClr val="0070C0"/>
+          </a:solidFill>
+          <a:ln>
+            <a:noFill/>
+          </a:ln>
+        </p:spPr>
+        <p:style>
+          <a:lnRef idx="2">
+            <a:schemeClr val="accent1">
+              <a:shade val="50000"/>
+            </a:schemeClr>
+          </a:lnRef>
+          <a:fillRef idx="1">
+            <a:schemeClr val="accent1"/>
+          </a:fillRef>
+          <a:effectRef idx="0">
+            <a:schemeClr val="accent1"/>
+          </a:effectRef>
+          <a:fontRef idx="minor">
+            <a:schemeClr val="lt1"/>
+          </a:fontRef>
+        </p:style>
+        <p:txBody>
+          <a:bodyPr rtlCol="0" anchor="ctr"/>
+          <a:lstStyle/>
+          <a:p>
+            <a:pPr algn="ctr"/>
+            <a:r>
+              <a:rPr lang="en-GB" sz="1200" dirty="0" smtClean="0"/>
+              <a:t>2</a:t>
+            </a:r>
+            <a:endParaRPr lang="en-GB" sz="1200" dirty="0"/>
+          </a:p>
+        </p:txBody>
+      </p:sp>
+      <p:sp>
+        <p:nvSpPr>
+          <p:cNvPr id="23" name="22 Rectángulo redondeado"/>
+          <p:cNvSpPr/>
+          <p:nvPr/>
+        </p:nvSpPr>
+        <p:spPr>
+          <a:xfrm>
+            <a:off x="-526920" y="2002488"/>
+            <a:ext cx="4284774" cy="994464"/>
+          </a:xfrm>
+          <a:prstGeom prst="roundRect">
+            <a:avLst/>
+          </a:prstGeom>
+          <a:noFill/>
+          <a:ln>
+            <a:solidFill>
+              <a:srgbClr val="92D050"/>
+            </a:solidFill>
+            <a:prstDash val="sysDash"/>
+          </a:ln>
+        </p:spPr>
+        <p:style>
+          <a:lnRef idx="2">
+            <a:schemeClr val="accent1">
+              <a:shade val="50000"/>
+            </a:schemeClr>
+          </a:lnRef>
+          <a:fillRef idx="1">
+            <a:schemeClr val="accent1"/>
+          </a:fillRef>
+          <a:effectRef idx="0">
+            <a:schemeClr val="accent1"/>
+          </a:effectRef>
+          <a:fontRef idx="minor">
+            <a:schemeClr val="lt1"/>
+          </a:fontRef>
+        </p:style>
+        <p:txBody>
+          <a:bodyPr rtlCol="0" anchor="ctr"/>
+          <a:lstStyle/>
+          <a:p>
+            <a:pPr algn="ctr"/>
+            <a:endParaRPr lang="en-GB"/>
+          </a:p>
+        </p:txBody>
+      </p:sp>
+    </p:spTree>
+    <p:extLst>
+      <p:ext uri="{BB962C8B-B14F-4D97-AF65-F5344CB8AC3E}">
+        <p14:creationId xmlns:p14="http://schemas.microsoft.com/office/powerpoint/2010/main" val="2515096317"/>
+      </p:ext>
+    </p:extLst>
+  </p:cSld>
+  <p:clrMapOvr>
+    <a:masterClrMapping/>
+  </p:clrMapOvr>
+</p:sld>
+</file>
+
 <file path=ppt/slides/slide2.xml><?xml version="1.0" encoding="utf-8"?>
 <p:sld xmlns:a="http://schemas.openxmlformats.org/drawingml/2006/main" xmlns:r="http://schemas.openxmlformats.org/officeDocument/2006/relationships" xmlns:p="http://schemas.openxmlformats.org/presentationml/2006/main">
   <p:cSld>
@@ -4600,7 +5269,7 @@
       </p:grpSpPr>
       <p:pic>
         <p:nvPicPr>
-          <p:cNvPr id="4" name="Picture 2" descr="C:\ESPD-EDM-02.00.00-asciidoc\espd-data-model\docs\src\main\asciidoc\images\PaymentOfTaxes_CA_mock-up.png"/>
+          <p:cNvPr id="1026" name="Picture 2" descr="C:\ESPD-EDM-02.00.00-asciidoc\espd-data-model\docs\src\main\asciidoc\images\Convictions__EO_mock-up.png"/>
           <p:cNvPicPr>
             <a:picLocks noChangeAspect="1" noChangeArrowheads="1"/>
           </p:cNvPicPr>
@@ -4621,8 +5290,8 @@
         </p:blipFill>
         <p:spPr bwMode="auto">
           <a:xfrm>
-            <a:off x="-1836712" y="610922"/>
-            <a:ext cx="11687175" cy="6238875"/>
+            <a:off x="971600" y="464021"/>
+            <a:ext cx="7192963" cy="5629275"/>
           </a:xfrm>
           <a:prstGeom prst="rect">
             <a:avLst/>
@@ -4641,24 +5310,23 @@
       </p:pic>
       <p:sp>
         <p:nvSpPr>
-          <p:cNvPr id="5" name="4 Rectángulo redondeado"/>
+          <p:cNvPr id="4" name="3 Elipse"/>
           <p:cNvSpPr/>
           <p:nvPr/>
         </p:nvSpPr>
         <p:spPr>
           <a:xfrm>
-            <a:off x="-1791274" y="1804944"/>
-            <a:ext cx="11600604" cy="496742"/>
-          </a:xfrm>
-          <a:prstGeom prst="roundRect">
-            <a:avLst/>
-          </a:prstGeom>
-          <a:noFill/>
+            <a:off x="8014112" y="2263581"/>
+            <a:ext cx="237681" cy="223557"/>
+          </a:xfrm>
+          <a:prstGeom prst="ellipse">
+            <a:avLst/>
+          </a:prstGeom>
+          <a:solidFill>
+            <a:srgbClr val="0070C0"/>
+          </a:solidFill>
           <a:ln>
-            <a:solidFill>
-              <a:srgbClr val="92D050"/>
-            </a:solidFill>
-            <a:prstDash val="sysDash"/>
+            <a:noFill/>
           </a:ln>
         </p:spPr>
         <p:style>
@@ -4682,84 +5350,33 @@
           <a:lstStyle/>
           <a:p>
             <a:pPr algn="ctr"/>
-            <a:endParaRPr lang="en-GB"/>
-          </a:p>
-        </p:txBody>
-      </p:sp>
-      <p:sp>
-        <p:nvSpPr>
-          <p:cNvPr id="6" name="5 CuadroTexto"/>
-          <p:cNvSpPr txBox="1"/>
-          <p:nvPr/>
-        </p:nvSpPr>
-        <p:spPr>
-          <a:xfrm>
-            <a:off x="9900592" y="1844824"/>
-            <a:ext cx="1747466" cy="369332"/>
-          </a:xfrm>
-          <a:prstGeom prst="rect">
-            <a:avLst/>
-          </a:prstGeom>
-          <a:noFill/>
-        </p:spPr>
-        <p:txBody>
-          <a:bodyPr wrap="none" rtlCol="0">
-            <a:spAutoFit/>
-          </a:bodyPr>
-          <a:lstStyle/>
-          <a:p>
-            <a:r>
-              <a:rPr lang="en-GB" b="1" dirty="0" smtClean="0">
-                <a:solidFill>
-                  <a:srgbClr val="00B050"/>
-                </a:solidFill>
-              </a:rPr>
-              <a:t>EU </a:t>
-            </a:r>
-            <a:r>
-              <a:rPr lang="en-GB" b="1" dirty="0" err="1" smtClean="0">
-                <a:solidFill>
-                  <a:srgbClr val="00B050"/>
-                </a:solidFill>
-              </a:rPr>
-              <a:t>PoT</a:t>
-            </a:r>
-            <a:r>
-              <a:rPr lang="en-GB" b="1" dirty="0" smtClean="0">
-                <a:solidFill>
-                  <a:srgbClr val="00B050"/>
-                </a:solidFill>
-              </a:rPr>
-              <a:t> Criterion</a:t>
-            </a:r>
-            <a:endParaRPr lang="en-GB" b="1" dirty="0">
-              <a:solidFill>
-                <a:srgbClr val="00B050"/>
-              </a:solidFill>
-            </a:endParaRPr>
-          </a:p>
-        </p:txBody>
-      </p:sp>
-      <p:sp>
-        <p:nvSpPr>
-          <p:cNvPr id="7" name="6 Rectángulo redondeado"/>
+            <a:r>
+              <a:rPr lang="en-GB" sz="1200" dirty="0" smtClean="0"/>
+              <a:t>1</a:t>
+            </a:r>
+            <a:endParaRPr lang="en-GB" sz="1200" dirty="0"/>
+          </a:p>
+        </p:txBody>
+      </p:sp>
+      <p:sp>
+        <p:nvSpPr>
+          <p:cNvPr id="6" name="5 Elipse"/>
           <p:cNvSpPr/>
           <p:nvPr/>
         </p:nvSpPr>
         <p:spPr>
           <a:xfrm>
-            <a:off x="-1750752" y="2492896"/>
-            <a:ext cx="11600604" cy="864096"/>
-          </a:xfrm>
-          <a:prstGeom prst="roundRect">
-            <a:avLst/>
-          </a:prstGeom>
-          <a:noFill/>
+            <a:off x="8014112" y="2617862"/>
+            <a:ext cx="237681" cy="223557"/>
+          </a:xfrm>
+          <a:prstGeom prst="ellipse">
+            <a:avLst/>
+          </a:prstGeom>
+          <a:solidFill>
+            <a:srgbClr val="0070C0"/>
+          </a:solidFill>
           <a:ln>
-            <a:solidFill>
-              <a:srgbClr val="92D050"/>
-            </a:solidFill>
-            <a:prstDash val="sysDash"/>
+            <a:noFill/>
           </a:ln>
         </p:spPr>
         <p:style>
@@ -4783,84 +5400,33 @@
           <a:lstStyle/>
           <a:p>
             <a:pPr algn="ctr"/>
-            <a:endParaRPr lang="en-GB"/>
-          </a:p>
-        </p:txBody>
-      </p:sp>
-      <p:sp>
-        <p:nvSpPr>
-          <p:cNvPr id="8" name="7 CuadroTexto"/>
-          <p:cNvSpPr txBox="1"/>
-          <p:nvPr/>
-        </p:nvSpPr>
-        <p:spPr>
-          <a:xfrm>
-            <a:off x="9864907" y="2728656"/>
-            <a:ext cx="1765099" cy="369332"/>
-          </a:xfrm>
-          <a:prstGeom prst="rect">
-            <a:avLst/>
-          </a:prstGeom>
-          <a:noFill/>
-        </p:spPr>
-        <p:txBody>
-          <a:bodyPr wrap="none" rtlCol="0">
-            <a:spAutoFit/>
-          </a:bodyPr>
-          <a:lstStyle/>
-          <a:p>
-            <a:r>
-              <a:rPr lang="en-GB" b="1" dirty="0" smtClean="0">
-                <a:solidFill>
-                  <a:srgbClr val="00B050"/>
-                </a:solidFill>
-              </a:rPr>
-              <a:t>FI </a:t>
-            </a:r>
-            <a:r>
-              <a:rPr lang="en-GB" b="1" dirty="0" err="1" smtClean="0">
-                <a:solidFill>
-                  <a:srgbClr val="00B050"/>
-                </a:solidFill>
-              </a:rPr>
-              <a:t>PoT</a:t>
-            </a:r>
-            <a:r>
-              <a:rPr lang="en-GB" b="1" dirty="0" smtClean="0">
-                <a:solidFill>
-                  <a:srgbClr val="00B050"/>
-                </a:solidFill>
-              </a:rPr>
-              <a:t> Criterion I</a:t>
-            </a:r>
-            <a:endParaRPr lang="en-GB" b="1" dirty="0">
-              <a:solidFill>
-                <a:srgbClr val="00B050"/>
-              </a:solidFill>
-            </a:endParaRPr>
-          </a:p>
-        </p:txBody>
-      </p:sp>
-      <p:sp>
-        <p:nvSpPr>
-          <p:cNvPr id="9" name="8 Rectángulo redondeado"/>
+            <a:r>
+              <a:rPr lang="en-GB" sz="1200" dirty="0" smtClean="0"/>
+              <a:t>2</a:t>
+            </a:r>
+            <a:endParaRPr lang="en-GB" sz="1200" dirty="0"/>
+          </a:p>
+        </p:txBody>
+      </p:sp>
+      <p:sp>
+        <p:nvSpPr>
+          <p:cNvPr id="7" name="6 Elipse"/>
           <p:cNvSpPr/>
           <p:nvPr/>
         </p:nvSpPr>
         <p:spPr>
           <a:xfrm>
-            <a:off x="-1764704" y="3356992"/>
-            <a:ext cx="11600604" cy="1152128"/>
-          </a:xfrm>
-          <a:prstGeom prst="roundRect">
-            <a:avLst/>
-          </a:prstGeom>
-          <a:noFill/>
+            <a:off x="8014112" y="2996952"/>
+            <a:ext cx="237681" cy="223557"/>
+          </a:xfrm>
+          <a:prstGeom prst="ellipse">
+            <a:avLst/>
+          </a:prstGeom>
+          <a:solidFill>
+            <a:srgbClr val="0070C0"/>
+          </a:solidFill>
           <a:ln>
-            <a:solidFill>
-              <a:srgbClr val="92D050"/>
-            </a:solidFill>
-            <a:prstDash val="sysDash"/>
+            <a:noFill/>
           </a:ln>
         </p:spPr>
         <p:style>
@@ -4884,84 +5450,33 @@
           <a:lstStyle/>
           <a:p>
             <a:pPr algn="ctr"/>
-            <a:endParaRPr lang="en-GB"/>
-          </a:p>
-        </p:txBody>
-      </p:sp>
-      <p:sp>
-        <p:nvSpPr>
-          <p:cNvPr id="10" name="9 CuadroTexto"/>
-          <p:cNvSpPr txBox="1"/>
-          <p:nvPr/>
-        </p:nvSpPr>
-        <p:spPr>
-          <a:xfrm>
-            <a:off x="9850955" y="3707740"/>
-            <a:ext cx="1826013" cy="369332"/>
-          </a:xfrm>
-          <a:prstGeom prst="rect">
-            <a:avLst/>
-          </a:prstGeom>
-          <a:noFill/>
-        </p:spPr>
-        <p:txBody>
-          <a:bodyPr wrap="none" rtlCol="0">
-            <a:spAutoFit/>
-          </a:bodyPr>
-          <a:lstStyle/>
-          <a:p>
-            <a:r>
-              <a:rPr lang="en-GB" b="1" dirty="0" smtClean="0">
-                <a:solidFill>
-                  <a:srgbClr val="00B050"/>
-                </a:solidFill>
-              </a:rPr>
-              <a:t>FI </a:t>
-            </a:r>
-            <a:r>
-              <a:rPr lang="en-GB" b="1" dirty="0" err="1" smtClean="0">
-                <a:solidFill>
-                  <a:srgbClr val="00B050"/>
-                </a:solidFill>
-              </a:rPr>
-              <a:t>PoT</a:t>
-            </a:r>
-            <a:r>
-              <a:rPr lang="en-GB" b="1" dirty="0" smtClean="0">
-                <a:solidFill>
-                  <a:srgbClr val="00B050"/>
-                </a:solidFill>
-              </a:rPr>
-              <a:t> Criterion II</a:t>
-            </a:r>
-            <a:endParaRPr lang="en-GB" b="1" dirty="0">
-              <a:solidFill>
-                <a:srgbClr val="00B050"/>
-              </a:solidFill>
-            </a:endParaRPr>
-          </a:p>
-        </p:txBody>
-      </p:sp>
-      <p:sp>
-        <p:nvSpPr>
-          <p:cNvPr id="11" name="10 Rectángulo redondeado"/>
+            <a:r>
+              <a:rPr lang="en-GB" sz="1200" dirty="0" smtClean="0"/>
+              <a:t>3</a:t>
+            </a:r>
+            <a:endParaRPr lang="en-GB" sz="1200" dirty="0"/>
+          </a:p>
+        </p:txBody>
+      </p:sp>
+      <p:sp>
+        <p:nvSpPr>
+          <p:cNvPr id="8" name="7 Elipse"/>
           <p:cNvSpPr/>
           <p:nvPr/>
         </p:nvSpPr>
         <p:spPr>
           <a:xfrm>
-            <a:off x="-1764704" y="4509120"/>
-            <a:ext cx="11600604" cy="936104"/>
-          </a:xfrm>
-          <a:prstGeom prst="roundRect">
-            <a:avLst/>
-          </a:prstGeom>
-          <a:noFill/>
+            <a:off x="8014112" y="3356992"/>
+            <a:ext cx="237681" cy="223557"/>
+          </a:xfrm>
+          <a:prstGeom prst="ellipse">
+            <a:avLst/>
+          </a:prstGeom>
+          <a:solidFill>
+            <a:srgbClr val="0070C0"/>
+          </a:solidFill>
           <a:ln>
-            <a:solidFill>
-              <a:srgbClr val="92D050"/>
-            </a:solidFill>
-            <a:prstDash val="sysDash"/>
+            <a:noFill/>
           </a:ln>
         </p:spPr>
         <p:style>
@@ -4985,84 +5500,33 @@
           <a:lstStyle/>
           <a:p>
             <a:pPr algn="ctr"/>
-            <a:endParaRPr lang="en-GB"/>
-          </a:p>
-        </p:txBody>
-      </p:sp>
-      <p:sp>
-        <p:nvSpPr>
-          <p:cNvPr id="12" name="11 CuadroTexto"/>
-          <p:cNvSpPr txBox="1"/>
-          <p:nvPr/>
-        </p:nvSpPr>
-        <p:spPr>
-          <a:xfrm>
-            <a:off x="9850955" y="4753610"/>
-            <a:ext cx="1886927" cy="369332"/>
-          </a:xfrm>
-          <a:prstGeom prst="rect">
-            <a:avLst/>
-          </a:prstGeom>
-          <a:noFill/>
-        </p:spPr>
-        <p:txBody>
-          <a:bodyPr wrap="none" rtlCol="0">
-            <a:spAutoFit/>
-          </a:bodyPr>
-          <a:lstStyle/>
-          <a:p>
-            <a:r>
-              <a:rPr lang="en-GB" b="1" dirty="0" smtClean="0">
-                <a:solidFill>
-                  <a:srgbClr val="00B050"/>
-                </a:solidFill>
-              </a:rPr>
-              <a:t>FI </a:t>
-            </a:r>
-            <a:r>
-              <a:rPr lang="en-GB" b="1" dirty="0" err="1" smtClean="0">
-                <a:solidFill>
-                  <a:srgbClr val="00B050"/>
-                </a:solidFill>
-              </a:rPr>
-              <a:t>PoT</a:t>
-            </a:r>
-            <a:r>
-              <a:rPr lang="en-GB" b="1" dirty="0" smtClean="0">
-                <a:solidFill>
-                  <a:srgbClr val="00B050"/>
-                </a:solidFill>
-              </a:rPr>
-              <a:t> Criterion III</a:t>
-            </a:r>
-            <a:endParaRPr lang="en-GB" b="1" dirty="0">
-              <a:solidFill>
-                <a:srgbClr val="00B050"/>
-              </a:solidFill>
-            </a:endParaRPr>
-          </a:p>
-        </p:txBody>
-      </p:sp>
-      <p:sp>
-        <p:nvSpPr>
-          <p:cNvPr id="13" name="12 Rectángulo redondeado"/>
+            <a:r>
+              <a:rPr lang="en-GB" sz="1200" dirty="0" smtClean="0"/>
+              <a:t>4</a:t>
+            </a:r>
+            <a:endParaRPr lang="en-GB" sz="1200" dirty="0"/>
+          </a:p>
+        </p:txBody>
+      </p:sp>
+      <p:sp>
+        <p:nvSpPr>
+          <p:cNvPr id="9" name="8 Elipse"/>
           <p:cNvSpPr/>
           <p:nvPr/>
         </p:nvSpPr>
         <p:spPr>
           <a:xfrm>
-            <a:off x="-1764704" y="5445224"/>
-            <a:ext cx="11600604" cy="1080120"/>
-          </a:xfrm>
-          <a:prstGeom prst="roundRect">
-            <a:avLst/>
-          </a:prstGeom>
-          <a:noFill/>
+            <a:off x="8014112" y="3697982"/>
+            <a:ext cx="237681" cy="223557"/>
+          </a:xfrm>
+          <a:prstGeom prst="ellipse">
+            <a:avLst/>
+          </a:prstGeom>
+          <a:solidFill>
+            <a:srgbClr val="0070C0"/>
+          </a:solidFill>
           <a:ln>
-            <a:solidFill>
-              <a:srgbClr val="92D050"/>
-            </a:solidFill>
-            <a:prstDash val="sysDash"/>
+            <a:noFill/>
           </a:ln>
         </p:spPr>
         <p:style>
@@ -5086,20 +5550,315 @@
           <a:lstStyle/>
           <a:p>
             <a:pPr algn="ctr"/>
-            <a:endParaRPr lang="en-GB"/>
-          </a:p>
-        </p:txBody>
-      </p:sp>
-      <p:sp>
-        <p:nvSpPr>
-          <p:cNvPr id="14" name="13 CuadroTexto"/>
+            <a:r>
+              <a:rPr lang="en-GB" sz="1200" dirty="0" smtClean="0"/>
+              <a:t>5</a:t>
+            </a:r>
+            <a:endParaRPr lang="en-GB" sz="1200" dirty="0"/>
+          </a:p>
+        </p:txBody>
+      </p:sp>
+      <p:sp>
+        <p:nvSpPr>
+          <p:cNvPr id="10" name="9 Elipse"/>
+          <p:cNvSpPr/>
+          <p:nvPr/>
+        </p:nvSpPr>
+        <p:spPr>
+          <a:xfrm>
+            <a:off x="8014112" y="4005064"/>
+            <a:ext cx="237681" cy="223557"/>
+          </a:xfrm>
+          <a:prstGeom prst="ellipse">
+            <a:avLst/>
+          </a:prstGeom>
+          <a:solidFill>
+            <a:srgbClr val="0070C0"/>
+          </a:solidFill>
+          <a:ln>
+            <a:noFill/>
+          </a:ln>
+        </p:spPr>
+        <p:style>
+          <a:lnRef idx="2">
+            <a:schemeClr val="accent1">
+              <a:shade val="50000"/>
+            </a:schemeClr>
+          </a:lnRef>
+          <a:fillRef idx="1">
+            <a:schemeClr val="accent1"/>
+          </a:fillRef>
+          <a:effectRef idx="0">
+            <a:schemeClr val="accent1"/>
+          </a:effectRef>
+          <a:fontRef idx="minor">
+            <a:schemeClr val="lt1"/>
+          </a:fontRef>
+        </p:style>
+        <p:txBody>
+          <a:bodyPr rtlCol="0" anchor="ctr"/>
+          <a:lstStyle/>
+          <a:p>
+            <a:pPr algn="ctr"/>
+            <a:r>
+              <a:rPr lang="en-GB" sz="1200" dirty="0" smtClean="0"/>
+              <a:t>6</a:t>
+            </a:r>
+            <a:endParaRPr lang="en-GB" sz="1200" dirty="0"/>
+          </a:p>
+        </p:txBody>
+      </p:sp>
+      <p:sp>
+        <p:nvSpPr>
+          <p:cNvPr id="11" name="10 Elipse"/>
+          <p:cNvSpPr/>
+          <p:nvPr/>
+        </p:nvSpPr>
+        <p:spPr>
+          <a:xfrm>
+            <a:off x="8014112" y="4357571"/>
+            <a:ext cx="237681" cy="223557"/>
+          </a:xfrm>
+          <a:prstGeom prst="ellipse">
+            <a:avLst/>
+          </a:prstGeom>
+          <a:solidFill>
+            <a:srgbClr val="0070C0"/>
+          </a:solidFill>
+          <a:ln>
+            <a:noFill/>
+          </a:ln>
+        </p:spPr>
+        <p:style>
+          <a:lnRef idx="2">
+            <a:schemeClr val="accent1">
+              <a:shade val="50000"/>
+            </a:schemeClr>
+          </a:lnRef>
+          <a:fillRef idx="1">
+            <a:schemeClr val="accent1"/>
+          </a:fillRef>
+          <a:effectRef idx="0">
+            <a:schemeClr val="accent1"/>
+          </a:effectRef>
+          <a:fontRef idx="minor">
+            <a:schemeClr val="lt1"/>
+          </a:fontRef>
+        </p:style>
+        <p:txBody>
+          <a:bodyPr rtlCol="0" anchor="ctr"/>
+          <a:lstStyle/>
+          <a:p>
+            <a:pPr algn="ctr"/>
+            <a:r>
+              <a:rPr lang="en-GB" sz="1200" dirty="0"/>
+              <a:t>7</a:t>
+            </a:r>
+          </a:p>
+        </p:txBody>
+      </p:sp>
+      <p:sp>
+        <p:nvSpPr>
+          <p:cNvPr id="12" name="11 Elipse"/>
+          <p:cNvSpPr/>
+          <p:nvPr/>
+        </p:nvSpPr>
+        <p:spPr>
+          <a:xfrm>
+            <a:off x="8014112" y="5149659"/>
+            <a:ext cx="237681" cy="223557"/>
+          </a:xfrm>
+          <a:prstGeom prst="ellipse">
+            <a:avLst/>
+          </a:prstGeom>
+          <a:solidFill>
+            <a:srgbClr val="0070C0"/>
+          </a:solidFill>
+          <a:ln>
+            <a:noFill/>
+          </a:ln>
+        </p:spPr>
+        <p:style>
+          <a:lnRef idx="2">
+            <a:schemeClr val="accent1">
+              <a:shade val="50000"/>
+            </a:schemeClr>
+          </a:lnRef>
+          <a:fillRef idx="1">
+            <a:schemeClr val="accent1"/>
+          </a:fillRef>
+          <a:effectRef idx="0">
+            <a:schemeClr val="accent1"/>
+          </a:effectRef>
+          <a:fontRef idx="minor">
+            <a:schemeClr val="lt1"/>
+          </a:fontRef>
+        </p:style>
+        <p:txBody>
+          <a:bodyPr rtlCol="0" anchor="ctr"/>
+          <a:lstStyle/>
+          <a:p>
+            <a:pPr algn="ctr"/>
+            <a:r>
+              <a:rPr lang="en-GB" sz="1200" dirty="0" smtClean="0"/>
+              <a:t>9</a:t>
+            </a:r>
+            <a:endParaRPr lang="en-GB" sz="1200" dirty="0"/>
+          </a:p>
+        </p:txBody>
+      </p:sp>
+      <p:sp>
+        <p:nvSpPr>
+          <p:cNvPr id="13" name="12 Elipse"/>
+          <p:cNvSpPr/>
+          <p:nvPr/>
+        </p:nvSpPr>
+        <p:spPr>
+          <a:xfrm>
+            <a:off x="8014112" y="5462282"/>
+            <a:ext cx="237681" cy="223557"/>
+          </a:xfrm>
+          <a:prstGeom prst="ellipse">
+            <a:avLst/>
+          </a:prstGeom>
+          <a:solidFill>
+            <a:srgbClr val="0070C0"/>
+          </a:solidFill>
+          <a:ln>
+            <a:noFill/>
+          </a:ln>
+        </p:spPr>
+        <p:style>
+          <a:lnRef idx="2">
+            <a:schemeClr val="accent1">
+              <a:shade val="50000"/>
+            </a:schemeClr>
+          </a:lnRef>
+          <a:fillRef idx="1">
+            <a:schemeClr val="accent1"/>
+          </a:fillRef>
+          <a:effectRef idx="0">
+            <a:schemeClr val="accent1"/>
+          </a:effectRef>
+          <a:fontRef idx="minor">
+            <a:schemeClr val="lt1"/>
+          </a:fontRef>
+        </p:style>
+        <p:txBody>
+          <a:bodyPr rtlCol="0" anchor="ctr"/>
+          <a:lstStyle/>
+          <a:p>
+            <a:pPr algn="ctr"/>
+            <a:endParaRPr lang="en-GB" sz="300" dirty="0"/>
+          </a:p>
+        </p:txBody>
+      </p:sp>
+      <p:sp>
+        <p:nvSpPr>
+          <p:cNvPr id="15" name="14 Elipse"/>
+          <p:cNvSpPr/>
+          <p:nvPr/>
+        </p:nvSpPr>
+        <p:spPr>
+          <a:xfrm>
+            <a:off x="8014112" y="5714253"/>
+            <a:ext cx="237681" cy="223557"/>
+          </a:xfrm>
+          <a:prstGeom prst="ellipse">
+            <a:avLst/>
+          </a:prstGeom>
+          <a:solidFill>
+            <a:srgbClr val="0070C0"/>
+          </a:solidFill>
+          <a:ln>
+            <a:noFill/>
+          </a:ln>
+        </p:spPr>
+        <p:style>
+          <a:lnRef idx="2">
+            <a:schemeClr val="accent1">
+              <a:shade val="50000"/>
+            </a:schemeClr>
+          </a:lnRef>
+          <a:fillRef idx="1">
+            <a:schemeClr val="accent1"/>
+          </a:fillRef>
+          <a:effectRef idx="0">
+            <a:schemeClr val="accent1"/>
+          </a:effectRef>
+          <a:fontRef idx="minor">
+            <a:schemeClr val="lt1"/>
+          </a:fontRef>
+        </p:style>
+        <p:txBody>
+          <a:bodyPr rtlCol="0" anchor="ctr"/>
+          <a:lstStyle/>
+          <a:p>
+            <a:pPr algn="ctr"/>
+            <a:endParaRPr lang="en-GB" sz="300" dirty="0"/>
+          </a:p>
+        </p:txBody>
+      </p:sp>
+      <p:sp>
+        <p:nvSpPr>
+          <p:cNvPr id="17" name="16 Elipse"/>
+          <p:cNvSpPr/>
+          <p:nvPr/>
+        </p:nvSpPr>
+        <p:spPr>
+          <a:xfrm>
+            <a:off x="8006727" y="4789619"/>
+            <a:ext cx="237681" cy="223557"/>
+          </a:xfrm>
+          <a:prstGeom prst="ellipse">
+            <a:avLst/>
+          </a:prstGeom>
+          <a:solidFill>
+            <a:srgbClr val="0070C0"/>
+          </a:solidFill>
+          <a:ln>
+            <a:noFill/>
+          </a:ln>
+        </p:spPr>
+        <p:style>
+          <a:lnRef idx="2">
+            <a:schemeClr val="accent1">
+              <a:shade val="50000"/>
+            </a:schemeClr>
+          </a:lnRef>
+          <a:fillRef idx="1">
+            <a:schemeClr val="accent1"/>
+          </a:fillRef>
+          <a:effectRef idx="0">
+            <a:schemeClr val="accent1"/>
+          </a:effectRef>
+          <a:fontRef idx="minor">
+            <a:schemeClr val="lt1"/>
+          </a:fontRef>
+        </p:style>
+        <p:txBody>
+          <a:bodyPr rtlCol="0" anchor="ctr"/>
+          <a:lstStyle/>
+          <a:p>
+            <a:pPr algn="ctr"/>
+            <a:r>
+              <a:rPr lang="en-GB" sz="1050" dirty="0" smtClean="0"/>
+              <a:t>8</a:t>
+            </a:r>
+            <a:endParaRPr lang="en-GB" sz="1050" dirty="0"/>
+          </a:p>
+        </p:txBody>
+      </p:sp>
+      <p:sp>
+        <p:nvSpPr>
+          <p:cNvPr id="18" name="17 CuadroTexto"/>
           <p:cNvSpPr txBox="1"/>
           <p:nvPr/>
         </p:nvSpPr>
         <p:spPr>
           <a:xfrm>
-            <a:off x="9850955" y="5795972"/>
-            <a:ext cx="1901354" cy="369332"/>
+            <a:off x="7968484" y="5435699"/>
+            <a:ext cx="328936" cy="261610"/>
           </a:xfrm>
           <a:prstGeom prst="rect">
             <a:avLst/>
@@ -5113,32 +5872,16 @@
           <a:lstStyle/>
           <a:p>
             <a:r>
-              <a:rPr lang="en-GB" b="1" dirty="0" smtClean="0">
+              <a:rPr lang="en-GB" sz="1100" dirty="0" smtClean="0">
                 <a:solidFill>
-                  <a:srgbClr val="00B050"/>
+                  <a:schemeClr val="bg1"/>
                 </a:solidFill>
               </a:rPr>
-              <a:t>FI </a:t>
-            </a:r>
-            <a:r>
-              <a:rPr lang="en-GB" b="1" dirty="0" err="1" smtClean="0">
-                <a:solidFill>
-                  <a:srgbClr val="00B050"/>
-                </a:solidFill>
-              </a:rPr>
-              <a:t>PoT</a:t>
-            </a:r>
-            <a:r>
-              <a:rPr lang="en-GB" b="1" dirty="0" smtClean="0">
-                <a:solidFill>
-                  <a:srgbClr val="00B050"/>
-                </a:solidFill>
-              </a:rPr>
-              <a:t> Criterion IV</a:t>
-            </a:r>
-            <a:endParaRPr lang="en-GB" b="1" dirty="0">
+              <a:t>10</a:t>
+            </a:r>
+            <a:endParaRPr lang="en-GB" sz="1100" dirty="0">
               <a:solidFill>
-                <a:srgbClr val="00B050"/>
+                <a:schemeClr val="bg1"/>
               </a:solidFill>
             </a:endParaRPr>
           </a:p>
@@ -5147,7 +5890,7 @@
     </p:spTree>
     <p:extLst>
       <p:ext uri="{BB962C8B-B14F-4D97-AF65-F5344CB8AC3E}">
-        <p14:creationId xmlns:p14="http://schemas.microsoft.com/office/powerpoint/2010/main" val="1792153492"/>
+        <p14:creationId xmlns:p14="http://schemas.microsoft.com/office/powerpoint/2010/main" val="537363499"/>
       </p:ext>
     </p:extLst>
   </p:cSld>
@@ -5176,7 +5919,7 @@
       </p:grpSpPr>
       <p:pic>
         <p:nvPicPr>
-          <p:cNvPr id="1026" name="Picture 2" descr="C:\ESPD-EDM-02.00.00-asciidoc\espd-data-model\docs\src\main\asciidoc\images\PaymentOfTaxes_EO_mock-up.png"/>
+          <p:cNvPr id="4" name="Picture 2" descr="C:\ESPD-EDM-02.00.00-asciidoc\espd-data-model\docs\src\main\asciidoc\images\PaymentOfTaxes_CA_mock-up.png"/>
           <p:cNvPicPr>
             <a:picLocks noChangeAspect="1" noChangeArrowheads="1"/>
           </p:cNvPicPr>
@@ -5197,8 +5940,8 @@
         </p:blipFill>
         <p:spPr bwMode="auto">
           <a:xfrm>
-            <a:off x="-252536" y="116632"/>
-            <a:ext cx="9572625" cy="6029325"/>
+            <a:off x="-1836712" y="610922"/>
+            <a:ext cx="11687175" cy="6238875"/>
           </a:xfrm>
           <a:prstGeom prst="rect">
             <a:avLst/>
@@ -5217,14 +5960,14 @@
       </p:pic>
       <p:sp>
         <p:nvSpPr>
-          <p:cNvPr id="4" name="3 Rectángulo redondeado"/>
+          <p:cNvPr id="5" name="4 Rectángulo redondeado"/>
           <p:cNvSpPr/>
           <p:nvPr/>
         </p:nvSpPr>
         <p:spPr>
           <a:xfrm>
-            <a:off x="3563888" y="2564904"/>
-            <a:ext cx="5580112" cy="1872208"/>
+            <a:off x="-1791274" y="1804944"/>
+            <a:ext cx="11600604" cy="496742"/>
           </a:xfrm>
           <a:prstGeom prst="roundRect">
             <a:avLst/>
@@ -5264,14 +6007,14 @@
       </p:sp>
       <p:sp>
         <p:nvSpPr>
-          <p:cNvPr id="5" name="4 CuadroTexto"/>
+          <p:cNvPr id="6" name="5 CuadroTexto"/>
           <p:cNvSpPr txBox="1"/>
           <p:nvPr/>
         </p:nvSpPr>
         <p:spPr>
           <a:xfrm>
-            <a:off x="899592" y="2767073"/>
-            <a:ext cx="2088232" cy="1477328"/>
+            <a:off x="9900592" y="1844824"/>
+            <a:ext cx="1747466" cy="369332"/>
           </a:xfrm>
           <a:prstGeom prst="rect">
             <a:avLst/>
@@ -5279,20 +6022,36 @@
           <a:noFill/>
         </p:spPr>
         <p:txBody>
-          <a:bodyPr wrap="square" rtlCol="0">
+          <a:bodyPr wrap="none" rtlCol="0">
             <a:spAutoFit/>
           </a:bodyPr>
           <a:lstStyle/>
           <a:p>
             <a:r>
-              <a:rPr lang="en-GB" dirty="0" smtClean="0">
+              <a:rPr lang="en-GB" b="1" dirty="0" smtClean="0">
                 <a:solidFill>
                   <a:srgbClr val="00B050"/>
                 </a:solidFill>
               </a:rPr>
-              <a:t>This property is shown only if the answer to the previous QUESTION is ‘Yes’</a:t>
-            </a:r>
-            <a:endParaRPr lang="en-GB" dirty="0">
+              <a:t>EU </a:t>
+            </a:r>
+            <a:r>
+              <a:rPr lang="en-GB" b="1" dirty="0" err="1" smtClean="0">
+                <a:solidFill>
+                  <a:srgbClr val="00B050"/>
+                </a:solidFill>
+              </a:rPr>
+              <a:t>PoT</a:t>
+            </a:r>
+            <a:r>
+              <a:rPr lang="en-GB" b="1" dirty="0" smtClean="0">
+                <a:solidFill>
+                  <a:srgbClr val="00B050"/>
+                </a:solidFill>
+              </a:rPr>
+              <a:t> Criterion</a:t>
+            </a:r>
+            <a:endParaRPr lang="en-GB" b="1" dirty="0">
               <a:solidFill>
                 <a:srgbClr val="00B050"/>
               </a:solidFill>
@@ -5300,49 +6059,660 @@
           </a:p>
         </p:txBody>
       </p:sp>
-      <p:cxnSp>
-        <p:nvCxnSpPr>
-          <p:cNvPr id="7" name="6 Conector recto de flecha"/>
-          <p:cNvCxnSpPr>
-            <a:stCxn id="5" idx="3"/>
-            <a:endCxn id="4" idx="1"/>
-          </p:cNvCxnSpPr>
-          <p:nvPr/>
-        </p:nvCxnSpPr>
-        <p:spPr>
-          <a:xfrm flipV="1">
-            <a:off x="2987824" y="3501008"/>
-            <a:ext cx="576064" cy="4729"/>
-          </a:xfrm>
-          <a:prstGeom prst="straightConnector1">
-            <a:avLst/>
-          </a:prstGeom>
-          <a:ln w="19050">
+      <p:sp>
+        <p:nvSpPr>
+          <p:cNvPr id="7" name="6 Rectángulo redondeado"/>
+          <p:cNvSpPr/>
+          <p:nvPr/>
+        </p:nvSpPr>
+        <p:spPr>
+          <a:xfrm>
+            <a:off x="-1750752" y="2492896"/>
+            <a:ext cx="11600604" cy="864096"/>
+          </a:xfrm>
+          <a:prstGeom prst="roundRect">
+            <a:avLst/>
+          </a:prstGeom>
+          <a:noFill/>
+          <a:ln>
             <a:solidFill>
               <a:srgbClr val="92D050"/>
             </a:solidFill>
-            <a:tailEnd type="arrow"/>
+            <a:prstDash val="sysDash"/>
           </a:ln>
         </p:spPr>
         <p:style>
-          <a:lnRef idx="1">
-            <a:schemeClr val="accent1"/>
+          <a:lnRef idx="2">
+            <a:schemeClr val="accent1">
+              <a:shade val="50000"/>
+            </a:schemeClr>
           </a:lnRef>
-          <a:fillRef idx="0">
+          <a:fillRef idx="1">
             <a:schemeClr val="accent1"/>
           </a:fillRef>
           <a:effectRef idx="0">
             <a:schemeClr val="accent1"/>
           </a:effectRef>
           <a:fontRef idx="minor">
-            <a:schemeClr val="tx1"/>
+            <a:schemeClr val="lt1"/>
           </a:fontRef>
         </p:style>
-      </p:cxnSp>
+        <p:txBody>
+          <a:bodyPr rtlCol="0" anchor="ctr"/>
+          <a:lstStyle/>
+          <a:p>
+            <a:pPr algn="ctr"/>
+            <a:endParaRPr lang="en-GB"/>
+          </a:p>
+        </p:txBody>
+      </p:sp>
+      <p:sp>
+        <p:nvSpPr>
+          <p:cNvPr id="8" name="7 CuadroTexto"/>
+          <p:cNvSpPr txBox="1"/>
+          <p:nvPr/>
+        </p:nvSpPr>
+        <p:spPr>
+          <a:xfrm>
+            <a:off x="9864907" y="2728656"/>
+            <a:ext cx="1765099" cy="369332"/>
+          </a:xfrm>
+          <a:prstGeom prst="rect">
+            <a:avLst/>
+          </a:prstGeom>
+          <a:noFill/>
+        </p:spPr>
+        <p:txBody>
+          <a:bodyPr wrap="none" rtlCol="0">
+            <a:spAutoFit/>
+          </a:bodyPr>
+          <a:lstStyle/>
+          <a:p>
+            <a:r>
+              <a:rPr lang="en-GB" b="1" dirty="0" smtClean="0">
+                <a:solidFill>
+                  <a:srgbClr val="00B050"/>
+                </a:solidFill>
+              </a:rPr>
+              <a:t>FI </a:t>
+            </a:r>
+            <a:r>
+              <a:rPr lang="en-GB" b="1" dirty="0" err="1" smtClean="0">
+                <a:solidFill>
+                  <a:srgbClr val="00B050"/>
+                </a:solidFill>
+              </a:rPr>
+              <a:t>PoT</a:t>
+            </a:r>
+            <a:r>
+              <a:rPr lang="en-GB" b="1" dirty="0" smtClean="0">
+                <a:solidFill>
+                  <a:srgbClr val="00B050"/>
+                </a:solidFill>
+              </a:rPr>
+              <a:t> Criterion I</a:t>
+            </a:r>
+            <a:endParaRPr lang="en-GB" b="1" dirty="0">
+              <a:solidFill>
+                <a:srgbClr val="00B050"/>
+              </a:solidFill>
+            </a:endParaRPr>
+          </a:p>
+        </p:txBody>
+      </p:sp>
+      <p:sp>
+        <p:nvSpPr>
+          <p:cNvPr id="9" name="8 Rectángulo redondeado"/>
+          <p:cNvSpPr/>
+          <p:nvPr/>
+        </p:nvSpPr>
+        <p:spPr>
+          <a:xfrm>
+            <a:off x="-1764704" y="3356992"/>
+            <a:ext cx="11600604" cy="1152128"/>
+          </a:xfrm>
+          <a:prstGeom prst="roundRect">
+            <a:avLst/>
+          </a:prstGeom>
+          <a:noFill/>
+          <a:ln>
+            <a:solidFill>
+              <a:srgbClr val="92D050"/>
+            </a:solidFill>
+            <a:prstDash val="sysDash"/>
+          </a:ln>
+        </p:spPr>
+        <p:style>
+          <a:lnRef idx="2">
+            <a:schemeClr val="accent1">
+              <a:shade val="50000"/>
+            </a:schemeClr>
+          </a:lnRef>
+          <a:fillRef idx="1">
+            <a:schemeClr val="accent1"/>
+          </a:fillRef>
+          <a:effectRef idx="0">
+            <a:schemeClr val="accent1"/>
+          </a:effectRef>
+          <a:fontRef idx="minor">
+            <a:schemeClr val="lt1"/>
+          </a:fontRef>
+        </p:style>
+        <p:txBody>
+          <a:bodyPr rtlCol="0" anchor="ctr"/>
+          <a:lstStyle/>
+          <a:p>
+            <a:pPr algn="ctr"/>
+            <a:endParaRPr lang="en-GB"/>
+          </a:p>
+        </p:txBody>
+      </p:sp>
+      <p:sp>
+        <p:nvSpPr>
+          <p:cNvPr id="10" name="9 CuadroTexto"/>
+          <p:cNvSpPr txBox="1"/>
+          <p:nvPr/>
+        </p:nvSpPr>
+        <p:spPr>
+          <a:xfrm>
+            <a:off x="9850955" y="3707740"/>
+            <a:ext cx="1826013" cy="369332"/>
+          </a:xfrm>
+          <a:prstGeom prst="rect">
+            <a:avLst/>
+          </a:prstGeom>
+          <a:noFill/>
+        </p:spPr>
+        <p:txBody>
+          <a:bodyPr wrap="none" rtlCol="0">
+            <a:spAutoFit/>
+          </a:bodyPr>
+          <a:lstStyle/>
+          <a:p>
+            <a:r>
+              <a:rPr lang="en-GB" b="1" dirty="0" smtClean="0">
+                <a:solidFill>
+                  <a:srgbClr val="00B050"/>
+                </a:solidFill>
+              </a:rPr>
+              <a:t>FI </a:t>
+            </a:r>
+            <a:r>
+              <a:rPr lang="en-GB" b="1" dirty="0" err="1" smtClean="0">
+                <a:solidFill>
+                  <a:srgbClr val="00B050"/>
+                </a:solidFill>
+              </a:rPr>
+              <a:t>PoT</a:t>
+            </a:r>
+            <a:r>
+              <a:rPr lang="en-GB" b="1" dirty="0" smtClean="0">
+                <a:solidFill>
+                  <a:srgbClr val="00B050"/>
+                </a:solidFill>
+              </a:rPr>
+              <a:t> Criterion II</a:t>
+            </a:r>
+            <a:endParaRPr lang="en-GB" b="1" dirty="0">
+              <a:solidFill>
+                <a:srgbClr val="00B050"/>
+              </a:solidFill>
+            </a:endParaRPr>
+          </a:p>
+        </p:txBody>
+      </p:sp>
+      <p:sp>
+        <p:nvSpPr>
+          <p:cNvPr id="11" name="10 Rectángulo redondeado"/>
+          <p:cNvSpPr/>
+          <p:nvPr/>
+        </p:nvSpPr>
+        <p:spPr>
+          <a:xfrm>
+            <a:off x="-1764704" y="4509120"/>
+            <a:ext cx="11600604" cy="936104"/>
+          </a:xfrm>
+          <a:prstGeom prst="roundRect">
+            <a:avLst/>
+          </a:prstGeom>
+          <a:noFill/>
+          <a:ln>
+            <a:solidFill>
+              <a:srgbClr val="92D050"/>
+            </a:solidFill>
+            <a:prstDash val="sysDash"/>
+          </a:ln>
+        </p:spPr>
+        <p:style>
+          <a:lnRef idx="2">
+            <a:schemeClr val="accent1">
+              <a:shade val="50000"/>
+            </a:schemeClr>
+          </a:lnRef>
+          <a:fillRef idx="1">
+            <a:schemeClr val="accent1"/>
+          </a:fillRef>
+          <a:effectRef idx="0">
+            <a:schemeClr val="accent1"/>
+          </a:effectRef>
+          <a:fontRef idx="minor">
+            <a:schemeClr val="lt1"/>
+          </a:fontRef>
+        </p:style>
+        <p:txBody>
+          <a:bodyPr rtlCol="0" anchor="ctr"/>
+          <a:lstStyle/>
+          <a:p>
+            <a:pPr algn="ctr"/>
+            <a:endParaRPr lang="en-GB"/>
+          </a:p>
+        </p:txBody>
+      </p:sp>
+      <p:sp>
+        <p:nvSpPr>
+          <p:cNvPr id="12" name="11 CuadroTexto"/>
+          <p:cNvSpPr txBox="1"/>
+          <p:nvPr/>
+        </p:nvSpPr>
+        <p:spPr>
+          <a:xfrm>
+            <a:off x="9850955" y="4753610"/>
+            <a:ext cx="1886927" cy="369332"/>
+          </a:xfrm>
+          <a:prstGeom prst="rect">
+            <a:avLst/>
+          </a:prstGeom>
+          <a:noFill/>
+        </p:spPr>
+        <p:txBody>
+          <a:bodyPr wrap="none" rtlCol="0">
+            <a:spAutoFit/>
+          </a:bodyPr>
+          <a:lstStyle/>
+          <a:p>
+            <a:r>
+              <a:rPr lang="en-GB" b="1" dirty="0" smtClean="0">
+                <a:solidFill>
+                  <a:srgbClr val="00B050"/>
+                </a:solidFill>
+              </a:rPr>
+              <a:t>FI </a:t>
+            </a:r>
+            <a:r>
+              <a:rPr lang="en-GB" b="1" dirty="0" err="1" smtClean="0">
+                <a:solidFill>
+                  <a:srgbClr val="00B050"/>
+                </a:solidFill>
+              </a:rPr>
+              <a:t>PoT</a:t>
+            </a:r>
+            <a:r>
+              <a:rPr lang="en-GB" b="1" dirty="0" smtClean="0">
+                <a:solidFill>
+                  <a:srgbClr val="00B050"/>
+                </a:solidFill>
+              </a:rPr>
+              <a:t> Criterion III</a:t>
+            </a:r>
+            <a:endParaRPr lang="en-GB" b="1" dirty="0">
+              <a:solidFill>
+                <a:srgbClr val="00B050"/>
+              </a:solidFill>
+            </a:endParaRPr>
+          </a:p>
+        </p:txBody>
+      </p:sp>
+      <p:sp>
+        <p:nvSpPr>
+          <p:cNvPr id="13" name="12 Rectángulo redondeado"/>
+          <p:cNvSpPr/>
+          <p:nvPr/>
+        </p:nvSpPr>
+        <p:spPr>
+          <a:xfrm>
+            <a:off x="-1764704" y="5445224"/>
+            <a:ext cx="11600604" cy="1080120"/>
+          </a:xfrm>
+          <a:prstGeom prst="roundRect">
+            <a:avLst/>
+          </a:prstGeom>
+          <a:noFill/>
+          <a:ln>
+            <a:solidFill>
+              <a:srgbClr val="92D050"/>
+            </a:solidFill>
+            <a:prstDash val="sysDash"/>
+          </a:ln>
+        </p:spPr>
+        <p:style>
+          <a:lnRef idx="2">
+            <a:schemeClr val="accent1">
+              <a:shade val="50000"/>
+            </a:schemeClr>
+          </a:lnRef>
+          <a:fillRef idx="1">
+            <a:schemeClr val="accent1"/>
+          </a:fillRef>
+          <a:effectRef idx="0">
+            <a:schemeClr val="accent1"/>
+          </a:effectRef>
+          <a:fontRef idx="minor">
+            <a:schemeClr val="lt1"/>
+          </a:fontRef>
+        </p:style>
+        <p:txBody>
+          <a:bodyPr rtlCol="0" anchor="ctr"/>
+          <a:lstStyle/>
+          <a:p>
+            <a:pPr algn="ctr"/>
+            <a:endParaRPr lang="en-GB"/>
+          </a:p>
+        </p:txBody>
+      </p:sp>
+      <p:sp>
+        <p:nvSpPr>
+          <p:cNvPr id="14" name="13 CuadroTexto"/>
+          <p:cNvSpPr txBox="1"/>
+          <p:nvPr/>
+        </p:nvSpPr>
+        <p:spPr>
+          <a:xfrm>
+            <a:off x="9850955" y="5795972"/>
+            <a:ext cx="1901354" cy="369332"/>
+          </a:xfrm>
+          <a:prstGeom prst="rect">
+            <a:avLst/>
+          </a:prstGeom>
+          <a:noFill/>
+        </p:spPr>
+        <p:txBody>
+          <a:bodyPr wrap="none" rtlCol="0">
+            <a:spAutoFit/>
+          </a:bodyPr>
+          <a:lstStyle/>
+          <a:p>
+            <a:r>
+              <a:rPr lang="en-GB" b="1" dirty="0" smtClean="0">
+                <a:solidFill>
+                  <a:srgbClr val="00B050"/>
+                </a:solidFill>
+              </a:rPr>
+              <a:t>FI </a:t>
+            </a:r>
+            <a:r>
+              <a:rPr lang="en-GB" b="1" dirty="0" err="1" smtClean="0">
+                <a:solidFill>
+                  <a:srgbClr val="00B050"/>
+                </a:solidFill>
+              </a:rPr>
+              <a:t>PoT</a:t>
+            </a:r>
+            <a:r>
+              <a:rPr lang="en-GB" b="1" dirty="0" smtClean="0">
+                <a:solidFill>
+                  <a:srgbClr val="00B050"/>
+                </a:solidFill>
+              </a:rPr>
+              <a:t> Criterion IV</a:t>
+            </a:r>
+            <a:endParaRPr lang="en-GB" b="1" dirty="0">
+              <a:solidFill>
+                <a:srgbClr val="00B050"/>
+              </a:solidFill>
+            </a:endParaRPr>
+          </a:p>
+        </p:txBody>
+      </p:sp>
+      <p:sp>
+        <p:nvSpPr>
+          <p:cNvPr id="15" name="14 Elipse"/>
+          <p:cNvSpPr/>
+          <p:nvPr/>
+        </p:nvSpPr>
+        <p:spPr>
+          <a:xfrm>
+            <a:off x="9662911" y="2125323"/>
+            <a:ext cx="237681" cy="223557"/>
+          </a:xfrm>
+          <a:prstGeom prst="ellipse">
+            <a:avLst/>
+          </a:prstGeom>
+          <a:solidFill>
+            <a:srgbClr val="0070C0"/>
+          </a:solidFill>
+          <a:ln>
+            <a:noFill/>
+          </a:ln>
+        </p:spPr>
+        <p:style>
+          <a:lnRef idx="2">
+            <a:schemeClr val="accent1">
+              <a:shade val="50000"/>
+            </a:schemeClr>
+          </a:lnRef>
+          <a:fillRef idx="1">
+            <a:schemeClr val="accent1"/>
+          </a:fillRef>
+          <a:effectRef idx="0">
+            <a:schemeClr val="accent1"/>
+          </a:effectRef>
+          <a:fontRef idx="minor">
+            <a:schemeClr val="lt1"/>
+          </a:fontRef>
+        </p:style>
+        <p:txBody>
+          <a:bodyPr rtlCol="0" anchor="ctr"/>
+          <a:lstStyle/>
+          <a:p>
+            <a:pPr algn="ctr"/>
+            <a:r>
+              <a:rPr lang="en-GB" sz="1200" dirty="0" smtClean="0"/>
+              <a:t>1</a:t>
+            </a:r>
+            <a:endParaRPr lang="en-GB" sz="1200" dirty="0"/>
+          </a:p>
+        </p:txBody>
+      </p:sp>
+      <p:sp>
+        <p:nvSpPr>
+          <p:cNvPr id="16" name="15 Elipse"/>
+          <p:cNvSpPr/>
+          <p:nvPr/>
+        </p:nvSpPr>
+        <p:spPr>
+          <a:xfrm>
+            <a:off x="9684568" y="3068960"/>
+            <a:ext cx="237681" cy="223557"/>
+          </a:xfrm>
+          <a:prstGeom prst="ellipse">
+            <a:avLst/>
+          </a:prstGeom>
+          <a:solidFill>
+            <a:srgbClr val="0070C0"/>
+          </a:solidFill>
+          <a:ln>
+            <a:noFill/>
+          </a:ln>
+        </p:spPr>
+        <p:style>
+          <a:lnRef idx="2">
+            <a:schemeClr val="accent1">
+              <a:shade val="50000"/>
+            </a:schemeClr>
+          </a:lnRef>
+          <a:fillRef idx="1">
+            <a:schemeClr val="accent1"/>
+          </a:fillRef>
+          <a:effectRef idx="0">
+            <a:schemeClr val="accent1"/>
+          </a:effectRef>
+          <a:fontRef idx="minor">
+            <a:schemeClr val="lt1"/>
+          </a:fontRef>
+        </p:style>
+        <p:txBody>
+          <a:bodyPr rtlCol="0" anchor="ctr"/>
+          <a:lstStyle/>
+          <a:p>
+            <a:pPr algn="ctr"/>
+            <a:r>
+              <a:rPr lang="en-GB" sz="1200" dirty="0"/>
+              <a:t>2</a:t>
+            </a:r>
+          </a:p>
+        </p:txBody>
+      </p:sp>
+      <p:sp>
+        <p:nvSpPr>
+          <p:cNvPr id="19" name="18 Elipse"/>
+          <p:cNvSpPr/>
+          <p:nvPr/>
+        </p:nvSpPr>
+        <p:spPr>
+          <a:xfrm>
+            <a:off x="9684568" y="4149080"/>
+            <a:ext cx="237681" cy="223557"/>
+          </a:xfrm>
+          <a:prstGeom prst="ellipse">
+            <a:avLst/>
+          </a:prstGeom>
+          <a:solidFill>
+            <a:srgbClr val="0070C0"/>
+          </a:solidFill>
+          <a:ln>
+            <a:noFill/>
+          </a:ln>
+        </p:spPr>
+        <p:style>
+          <a:lnRef idx="2">
+            <a:schemeClr val="accent1">
+              <a:shade val="50000"/>
+            </a:schemeClr>
+          </a:lnRef>
+          <a:fillRef idx="1">
+            <a:schemeClr val="accent1"/>
+          </a:fillRef>
+          <a:effectRef idx="0">
+            <a:schemeClr val="accent1"/>
+          </a:effectRef>
+          <a:fontRef idx="minor">
+            <a:schemeClr val="lt1"/>
+          </a:fontRef>
+        </p:style>
+        <p:txBody>
+          <a:bodyPr rtlCol="0" anchor="ctr"/>
+          <a:lstStyle/>
+          <a:p>
+            <a:pPr algn="ctr"/>
+            <a:r>
+              <a:rPr lang="en-GB" sz="1200" dirty="0"/>
+              <a:t>3</a:t>
+            </a:r>
+          </a:p>
+        </p:txBody>
+      </p:sp>
+      <p:sp>
+        <p:nvSpPr>
+          <p:cNvPr id="20" name="19 Elipse"/>
+          <p:cNvSpPr/>
+          <p:nvPr/>
+        </p:nvSpPr>
+        <p:spPr>
+          <a:xfrm>
+            <a:off x="9684568" y="5149659"/>
+            <a:ext cx="237681" cy="223557"/>
+          </a:xfrm>
+          <a:prstGeom prst="ellipse">
+            <a:avLst/>
+          </a:prstGeom>
+          <a:solidFill>
+            <a:srgbClr val="0070C0"/>
+          </a:solidFill>
+          <a:ln>
+            <a:noFill/>
+          </a:ln>
+        </p:spPr>
+        <p:style>
+          <a:lnRef idx="2">
+            <a:schemeClr val="accent1">
+              <a:shade val="50000"/>
+            </a:schemeClr>
+          </a:lnRef>
+          <a:fillRef idx="1">
+            <a:schemeClr val="accent1"/>
+          </a:fillRef>
+          <a:effectRef idx="0">
+            <a:schemeClr val="accent1"/>
+          </a:effectRef>
+          <a:fontRef idx="minor">
+            <a:schemeClr val="lt1"/>
+          </a:fontRef>
+        </p:style>
+        <p:txBody>
+          <a:bodyPr rtlCol="0" anchor="ctr"/>
+          <a:lstStyle/>
+          <a:p>
+            <a:pPr algn="ctr"/>
+            <a:r>
+              <a:rPr lang="en-GB" sz="1200" dirty="0"/>
+              <a:t>4</a:t>
+            </a:r>
+          </a:p>
+        </p:txBody>
+      </p:sp>
+      <p:sp>
+        <p:nvSpPr>
+          <p:cNvPr id="21" name="20 Elipse"/>
+          <p:cNvSpPr/>
+          <p:nvPr/>
+        </p:nvSpPr>
+        <p:spPr>
+          <a:xfrm>
+            <a:off x="9684568" y="6237312"/>
+            <a:ext cx="237681" cy="223557"/>
+          </a:xfrm>
+          <a:prstGeom prst="ellipse">
+            <a:avLst/>
+          </a:prstGeom>
+          <a:solidFill>
+            <a:srgbClr val="0070C0"/>
+          </a:solidFill>
+          <a:ln>
+            <a:noFill/>
+          </a:ln>
+        </p:spPr>
+        <p:style>
+          <a:lnRef idx="2">
+            <a:schemeClr val="accent1">
+              <a:shade val="50000"/>
+            </a:schemeClr>
+          </a:lnRef>
+          <a:fillRef idx="1">
+            <a:schemeClr val="accent1"/>
+          </a:fillRef>
+          <a:effectRef idx="0">
+            <a:schemeClr val="accent1"/>
+          </a:effectRef>
+          <a:fontRef idx="minor">
+            <a:schemeClr val="lt1"/>
+          </a:fontRef>
+        </p:style>
+        <p:txBody>
+          <a:bodyPr rtlCol="0" anchor="ctr"/>
+          <a:lstStyle/>
+          <a:p>
+            <a:pPr algn="ctr"/>
+            <a:r>
+              <a:rPr lang="en-GB" sz="1200" dirty="0"/>
+              <a:t>5</a:t>
+            </a:r>
+          </a:p>
+        </p:txBody>
+      </p:sp>
     </p:spTree>
     <p:extLst>
       <p:ext uri="{BB962C8B-B14F-4D97-AF65-F5344CB8AC3E}">
-        <p14:creationId xmlns:p14="http://schemas.microsoft.com/office/powerpoint/2010/main" val="2606548167"/>
+        <p14:creationId xmlns:p14="http://schemas.microsoft.com/office/powerpoint/2010/main" val="1792153492"/>
       </p:ext>
     </p:extLst>
   </p:cSld>
@@ -5371,7 +6741,7 @@
       </p:grpSpPr>
       <p:pic>
         <p:nvPicPr>
-          <p:cNvPr id="2050" name="Picture 2" descr="C:\ESPD-EDM-02.00.00-asciidoc\espd-data-model\docs\src\main\asciidoc\images\PaymentOfTaxes_EO_mock-up-2.png"/>
+          <p:cNvPr id="1026" name="Picture 2" descr="C:\ESPD-EDM-02.00.00-asciidoc\espd-data-model\docs\src\main\asciidoc\images\PaymentOfTaxes_EO_mock-up.png"/>
           <p:cNvPicPr>
             <a:picLocks noChangeAspect="1" noChangeArrowheads="1"/>
           </p:cNvPicPr>
@@ -5392,8 +6762,8 @@
         </p:blipFill>
         <p:spPr bwMode="auto">
           <a:xfrm>
-            <a:off x="438025" y="404664"/>
-            <a:ext cx="8526463" cy="5610225"/>
+            <a:off x="-252536" y="116632"/>
+            <a:ext cx="9572625" cy="6029325"/>
           </a:xfrm>
           <a:prstGeom prst="rect">
             <a:avLst/>
@@ -5418,8 +6788,8 @@
         </p:nvSpPr>
         <p:spPr>
           <a:xfrm>
-            <a:off x="3779912" y="2564904"/>
-            <a:ext cx="5184576" cy="1872208"/>
+            <a:off x="3563888" y="2564904"/>
+            <a:ext cx="5580112" cy="1872208"/>
           </a:xfrm>
           <a:prstGeom prst="roundRect">
             <a:avLst/>
@@ -5465,7 +6835,7 @@
         </p:nvSpPr>
         <p:spPr>
           <a:xfrm>
-            <a:off x="1301387" y="2764340"/>
+            <a:off x="899592" y="2767073"/>
             <a:ext cx="2088232" cy="1477328"/>
           </a:xfrm>
           <a:prstGeom prst="rect">
@@ -5485,7 +6855,7 @@
                   <a:srgbClr val="00B050"/>
                 </a:solidFill>
               </a:rPr>
-              <a:t>This group of property is shown only if the answer to the previous QUESTION is ‘No’</a:t>
+              <a:t>This property is shown only if the answer to the previous QUESTION is ‘Yes’</a:t>
             </a:r>
             <a:endParaRPr lang="en-GB" dirty="0">
               <a:solidFill>
@@ -5506,8 +6876,8 @@
         </p:nvCxnSpPr>
         <p:spPr>
           <a:xfrm flipV="1">
-            <a:off x="3389619" y="3501008"/>
-            <a:ext cx="390293" cy="1996"/>
+            <a:off x="2987824" y="3501008"/>
+            <a:ext cx="576064" cy="4729"/>
           </a:xfrm>
           <a:prstGeom prst="straightConnector1">
             <a:avLst/>
@@ -5534,6 +6904,992 @@
           </a:fontRef>
         </p:style>
       </p:cxnSp>
+      <p:sp>
+        <p:nvSpPr>
+          <p:cNvPr id="6" name="5 Elipse"/>
+          <p:cNvSpPr/>
+          <p:nvPr/>
+        </p:nvSpPr>
+        <p:spPr>
+          <a:xfrm>
+            <a:off x="8973686" y="1333235"/>
+            <a:ext cx="237681" cy="223557"/>
+          </a:xfrm>
+          <a:prstGeom prst="ellipse">
+            <a:avLst/>
+          </a:prstGeom>
+          <a:solidFill>
+            <a:srgbClr val="0070C0"/>
+          </a:solidFill>
+          <a:ln>
+            <a:noFill/>
+          </a:ln>
+        </p:spPr>
+        <p:style>
+          <a:lnRef idx="2">
+            <a:schemeClr val="accent1">
+              <a:shade val="50000"/>
+            </a:schemeClr>
+          </a:lnRef>
+          <a:fillRef idx="1">
+            <a:schemeClr val="accent1"/>
+          </a:fillRef>
+          <a:effectRef idx="0">
+            <a:schemeClr val="accent1"/>
+          </a:effectRef>
+          <a:fontRef idx="minor">
+            <a:schemeClr val="lt1"/>
+          </a:fontRef>
+        </p:style>
+        <p:txBody>
+          <a:bodyPr rtlCol="0" anchor="ctr"/>
+          <a:lstStyle/>
+          <a:p>
+            <a:pPr algn="ctr"/>
+            <a:r>
+              <a:rPr lang="en-GB" sz="1200" dirty="0" smtClean="0"/>
+              <a:t>1</a:t>
+            </a:r>
+            <a:endParaRPr lang="en-GB" sz="1200" dirty="0"/>
+          </a:p>
+        </p:txBody>
+      </p:sp>
+      <p:sp>
+        <p:nvSpPr>
+          <p:cNvPr id="8" name="7 Elipse"/>
+          <p:cNvSpPr/>
+          <p:nvPr/>
+        </p:nvSpPr>
+        <p:spPr>
+          <a:xfrm>
+            <a:off x="7543615" y="1813760"/>
+            <a:ext cx="237681" cy="223557"/>
+          </a:xfrm>
+          <a:prstGeom prst="ellipse">
+            <a:avLst/>
+          </a:prstGeom>
+          <a:solidFill>
+            <a:srgbClr val="0070C0"/>
+          </a:solidFill>
+          <a:ln>
+            <a:noFill/>
+          </a:ln>
+        </p:spPr>
+        <p:style>
+          <a:lnRef idx="2">
+            <a:schemeClr val="accent1">
+              <a:shade val="50000"/>
+            </a:schemeClr>
+          </a:lnRef>
+          <a:fillRef idx="1">
+            <a:schemeClr val="accent1"/>
+          </a:fillRef>
+          <a:effectRef idx="0">
+            <a:schemeClr val="accent1"/>
+          </a:effectRef>
+          <a:fontRef idx="minor">
+            <a:schemeClr val="lt1"/>
+          </a:fontRef>
+        </p:style>
+        <p:txBody>
+          <a:bodyPr rtlCol="0" anchor="ctr"/>
+          <a:lstStyle/>
+          <a:p>
+            <a:pPr algn="ctr"/>
+            <a:r>
+              <a:rPr lang="en-GB" sz="1200" dirty="0"/>
+              <a:t>2</a:t>
+            </a:r>
+          </a:p>
+        </p:txBody>
+      </p:sp>
+      <p:sp>
+        <p:nvSpPr>
+          <p:cNvPr id="9" name="8 Elipse"/>
+          <p:cNvSpPr/>
+          <p:nvPr/>
+        </p:nvSpPr>
+        <p:spPr>
+          <a:xfrm>
+            <a:off x="8973686" y="1811056"/>
+            <a:ext cx="237681" cy="223557"/>
+          </a:xfrm>
+          <a:prstGeom prst="ellipse">
+            <a:avLst/>
+          </a:prstGeom>
+          <a:solidFill>
+            <a:srgbClr val="0070C0"/>
+          </a:solidFill>
+          <a:ln>
+            <a:noFill/>
+          </a:ln>
+        </p:spPr>
+        <p:style>
+          <a:lnRef idx="2">
+            <a:schemeClr val="accent1">
+              <a:shade val="50000"/>
+            </a:schemeClr>
+          </a:lnRef>
+          <a:fillRef idx="1">
+            <a:schemeClr val="accent1"/>
+          </a:fillRef>
+          <a:effectRef idx="0">
+            <a:schemeClr val="accent1"/>
+          </a:effectRef>
+          <a:fontRef idx="minor">
+            <a:schemeClr val="lt1"/>
+          </a:fontRef>
+        </p:style>
+        <p:txBody>
+          <a:bodyPr rtlCol="0" anchor="ctr"/>
+          <a:lstStyle/>
+          <a:p>
+            <a:pPr algn="ctr"/>
+            <a:r>
+              <a:rPr lang="en-GB" sz="1200" dirty="0"/>
+              <a:t>3</a:t>
+            </a:r>
+          </a:p>
+        </p:txBody>
+      </p:sp>
+      <p:sp>
+        <p:nvSpPr>
+          <p:cNvPr id="10" name="9 Elipse"/>
+          <p:cNvSpPr/>
+          <p:nvPr/>
+        </p:nvSpPr>
+        <p:spPr>
+          <a:xfrm>
+            <a:off x="8973686" y="2755015"/>
+            <a:ext cx="237681" cy="223557"/>
+          </a:xfrm>
+          <a:prstGeom prst="ellipse">
+            <a:avLst/>
+          </a:prstGeom>
+          <a:solidFill>
+            <a:srgbClr val="0070C0"/>
+          </a:solidFill>
+          <a:ln>
+            <a:noFill/>
+          </a:ln>
+        </p:spPr>
+        <p:style>
+          <a:lnRef idx="2">
+            <a:schemeClr val="accent1">
+              <a:shade val="50000"/>
+            </a:schemeClr>
+          </a:lnRef>
+          <a:fillRef idx="1">
+            <a:schemeClr val="accent1"/>
+          </a:fillRef>
+          <a:effectRef idx="0">
+            <a:schemeClr val="accent1"/>
+          </a:effectRef>
+          <a:fontRef idx="minor">
+            <a:schemeClr val="lt1"/>
+          </a:fontRef>
+        </p:style>
+        <p:txBody>
+          <a:bodyPr rtlCol="0" anchor="ctr"/>
+          <a:lstStyle/>
+          <a:p>
+            <a:pPr algn="ctr"/>
+            <a:r>
+              <a:rPr lang="en-GB" sz="1200" dirty="0"/>
+              <a:t>4</a:t>
+            </a:r>
+          </a:p>
+        </p:txBody>
+      </p:sp>
+      <p:sp>
+        <p:nvSpPr>
+          <p:cNvPr id="11" name="10 Elipse"/>
+          <p:cNvSpPr/>
+          <p:nvPr/>
+        </p:nvSpPr>
+        <p:spPr>
+          <a:xfrm>
+            <a:off x="8973686" y="4020844"/>
+            <a:ext cx="237681" cy="223557"/>
+          </a:xfrm>
+          <a:prstGeom prst="ellipse">
+            <a:avLst/>
+          </a:prstGeom>
+          <a:solidFill>
+            <a:srgbClr val="0070C0"/>
+          </a:solidFill>
+          <a:ln>
+            <a:noFill/>
+          </a:ln>
+        </p:spPr>
+        <p:style>
+          <a:lnRef idx="2">
+            <a:schemeClr val="accent1">
+              <a:shade val="50000"/>
+            </a:schemeClr>
+          </a:lnRef>
+          <a:fillRef idx="1">
+            <a:schemeClr val="accent1"/>
+          </a:fillRef>
+          <a:effectRef idx="0">
+            <a:schemeClr val="accent1"/>
+          </a:effectRef>
+          <a:fontRef idx="minor">
+            <a:schemeClr val="lt1"/>
+          </a:fontRef>
+        </p:style>
+        <p:txBody>
+          <a:bodyPr rtlCol="0" anchor="ctr"/>
+          <a:lstStyle/>
+          <a:p>
+            <a:pPr algn="ctr"/>
+            <a:r>
+              <a:rPr lang="en-GB" sz="1200" dirty="0"/>
+              <a:t>5</a:t>
+            </a:r>
+          </a:p>
+        </p:txBody>
+      </p:sp>
+      <p:sp>
+        <p:nvSpPr>
+          <p:cNvPr id="12" name="11 Elipse"/>
+          <p:cNvSpPr/>
+          <p:nvPr/>
+        </p:nvSpPr>
+        <p:spPr>
+          <a:xfrm>
+            <a:off x="8973686" y="4951051"/>
+            <a:ext cx="237681" cy="223557"/>
+          </a:xfrm>
+          <a:prstGeom prst="ellipse">
+            <a:avLst/>
+          </a:prstGeom>
+          <a:solidFill>
+            <a:srgbClr val="0070C0"/>
+          </a:solidFill>
+          <a:ln>
+            <a:noFill/>
+          </a:ln>
+        </p:spPr>
+        <p:style>
+          <a:lnRef idx="2">
+            <a:schemeClr val="accent1">
+              <a:shade val="50000"/>
+            </a:schemeClr>
+          </a:lnRef>
+          <a:fillRef idx="1">
+            <a:schemeClr val="accent1"/>
+          </a:fillRef>
+          <a:effectRef idx="0">
+            <a:schemeClr val="accent1"/>
+          </a:effectRef>
+          <a:fontRef idx="minor">
+            <a:schemeClr val="lt1"/>
+          </a:fontRef>
+        </p:style>
+        <p:txBody>
+          <a:bodyPr rtlCol="0" anchor="ctr"/>
+          <a:lstStyle/>
+          <a:p>
+            <a:pPr algn="ctr"/>
+            <a:r>
+              <a:rPr lang="en-GB" sz="1200" dirty="0"/>
+              <a:t>6</a:t>
+            </a:r>
+          </a:p>
+        </p:txBody>
+      </p:sp>
+      <p:sp>
+        <p:nvSpPr>
+          <p:cNvPr id="13" name="12 Elipse"/>
+          <p:cNvSpPr/>
+          <p:nvPr/>
+        </p:nvSpPr>
+        <p:spPr>
+          <a:xfrm>
+            <a:off x="8973686" y="5328504"/>
+            <a:ext cx="237681" cy="223557"/>
+          </a:xfrm>
+          <a:prstGeom prst="ellipse">
+            <a:avLst/>
+          </a:prstGeom>
+          <a:solidFill>
+            <a:srgbClr val="0070C0"/>
+          </a:solidFill>
+          <a:ln>
+            <a:noFill/>
+          </a:ln>
+        </p:spPr>
+        <p:style>
+          <a:lnRef idx="2">
+            <a:schemeClr val="accent1">
+              <a:shade val="50000"/>
+            </a:schemeClr>
+          </a:lnRef>
+          <a:fillRef idx="1">
+            <a:schemeClr val="accent1"/>
+          </a:fillRef>
+          <a:effectRef idx="0">
+            <a:schemeClr val="accent1"/>
+          </a:effectRef>
+          <a:fontRef idx="minor">
+            <a:schemeClr val="lt1"/>
+          </a:fontRef>
+        </p:style>
+        <p:txBody>
+          <a:bodyPr rtlCol="0" anchor="ctr"/>
+          <a:lstStyle/>
+          <a:p>
+            <a:pPr algn="ctr"/>
+            <a:r>
+              <a:rPr lang="en-GB" sz="1200" dirty="0" smtClean="0"/>
+              <a:t>7</a:t>
+            </a:r>
+            <a:endParaRPr lang="en-GB" sz="1200" dirty="0"/>
+          </a:p>
+        </p:txBody>
+      </p:sp>
+      <p:sp>
+        <p:nvSpPr>
+          <p:cNvPr id="14" name="13 Elipse"/>
+          <p:cNvSpPr/>
+          <p:nvPr/>
+        </p:nvSpPr>
+        <p:spPr>
+          <a:xfrm>
+            <a:off x="8973686" y="5702192"/>
+            <a:ext cx="237681" cy="223557"/>
+          </a:xfrm>
+          <a:prstGeom prst="ellipse">
+            <a:avLst/>
+          </a:prstGeom>
+          <a:solidFill>
+            <a:srgbClr val="0070C0"/>
+          </a:solidFill>
+          <a:ln>
+            <a:noFill/>
+          </a:ln>
+        </p:spPr>
+        <p:style>
+          <a:lnRef idx="2">
+            <a:schemeClr val="accent1">
+              <a:shade val="50000"/>
+            </a:schemeClr>
+          </a:lnRef>
+          <a:fillRef idx="1">
+            <a:schemeClr val="accent1"/>
+          </a:fillRef>
+          <a:effectRef idx="0">
+            <a:schemeClr val="accent1"/>
+          </a:effectRef>
+          <a:fontRef idx="minor">
+            <a:schemeClr val="lt1"/>
+          </a:fontRef>
+        </p:style>
+        <p:txBody>
+          <a:bodyPr rtlCol="0" anchor="ctr"/>
+          <a:lstStyle/>
+          <a:p>
+            <a:pPr algn="ctr"/>
+            <a:r>
+              <a:rPr lang="en-GB" sz="1200" dirty="0" smtClean="0"/>
+              <a:t>8</a:t>
+            </a:r>
+            <a:endParaRPr lang="en-GB" sz="1200" dirty="0"/>
+          </a:p>
+        </p:txBody>
+      </p:sp>
+    </p:spTree>
+    <p:extLst>
+      <p:ext uri="{BB962C8B-B14F-4D97-AF65-F5344CB8AC3E}">
+        <p14:creationId xmlns:p14="http://schemas.microsoft.com/office/powerpoint/2010/main" val="2606548167"/>
+      </p:ext>
+    </p:extLst>
+  </p:cSld>
+  <p:clrMapOvr>
+    <a:masterClrMapping/>
+  </p:clrMapOvr>
+</p:sld>
+</file>
+
+<file path=ppt/slides/slide9.xml><?xml version="1.0" encoding="utf-8"?>
+<p:sld xmlns:a="http://schemas.openxmlformats.org/drawingml/2006/main" xmlns:r="http://schemas.openxmlformats.org/officeDocument/2006/relationships" xmlns:p="http://schemas.openxmlformats.org/presentationml/2006/main">
+  <p:cSld>
+    <p:spTree>
+      <p:nvGrpSpPr>
+        <p:cNvPr id="1" name=""/>
+        <p:cNvGrpSpPr/>
+        <p:nvPr/>
+      </p:nvGrpSpPr>
+      <p:grpSpPr>
+        <a:xfrm>
+          <a:off x="0" y="0"/>
+          <a:ext cx="0" cy="0"/>
+          <a:chOff x="0" y="0"/>
+          <a:chExt cx="0" cy="0"/>
+        </a:xfrm>
+      </p:grpSpPr>
+      <p:pic>
+        <p:nvPicPr>
+          <p:cNvPr id="2050" name="Picture 2" descr="C:\ESPD-EDM-02.00.00-asciidoc\espd-data-model\docs\src\main\asciidoc\images\PaymentOfTaxes_EO_mock-up-2.png"/>
+          <p:cNvPicPr>
+            <a:picLocks noChangeAspect="1" noChangeArrowheads="1"/>
+          </p:cNvPicPr>
+          <p:nvPr/>
+        </p:nvPicPr>
+        <p:blipFill>
+          <a:blip r:embed="rId2">
+            <a:extLst>
+              <a:ext uri="{28A0092B-C50C-407E-A947-70E740481C1C}">
+                <a14:useLocalDpi xmlns:a14="http://schemas.microsoft.com/office/drawing/2010/main" val="0"/>
+              </a:ext>
+            </a:extLst>
+          </a:blip>
+          <a:srcRect/>
+          <a:stretch>
+            <a:fillRect/>
+          </a:stretch>
+        </p:blipFill>
+        <p:spPr bwMode="auto">
+          <a:xfrm>
+            <a:off x="438025" y="404664"/>
+            <a:ext cx="8526463" cy="5610225"/>
+          </a:xfrm>
+          <a:prstGeom prst="rect">
+            <a:avLst/>
+          </a:prstGeom>
+          <a:noFill/>
+          <a:extLst>
+            <a:ext uri="{909E8E84-426E-40DD-AFC4-6F175D3DCCD1}">
+              <a14:hiddenFill xmlns:a14="http://schemas.microsoft.com/office/drawing/2010/main">
+                <a:solidFill>
+                  <a:srgbClr val="FFFFFF"/>
+                </a:solidFill>
+              </a14:hiddenFill>
+            </a:ext>
+          </a:extLst>
+        </p:spPr>
+      </p:pic>
+      <p:sp>
+        <p:nvSpPr>
+          <p:cNvPr id="4" name="3 Rectángulo redondeado"/>
+          <p:cNvSpPr/>
+          <p:nvPr/>
+        </p:nvSpPr>
+        <p:spPr>
+          <a:xfrm>
+            <a:off x="3779912" y="2564904"/>
+            <a:ext cx="5184576" cy="1872208"/>
+          </a:xfrm>
+          <a:prstGeom prst="roundRect">
+            <a:avLst/>
+          </a:prstGeom>
+          <a:noFill/>
+          <a:ln>
+            <a:solidFill>
+              <a:srgbClr val="92D050"/>
+            </a:solidFill>
+            <a:prstDash val="sysDash"/>
+          </a:ln>
+        </p:spPr>
+        <p:style>
+          <a:lnRef idx="2">
+            <a:schemeClr val="accent1">
+              <a:shade val="50000"/>
+            </a:schemeClr>
+          </a:lnRef>
+          <a:fillRef idx="1">
+            <a:schemeClr val="accent1"/>
+          </a:fillRef>
+          <a:effectRef idx="0">
+            <a:schemeClr val="accent1"/>
+          </a:effectRef>
+          <a:fontRef idx="minor">
+            <a:schemeClr val="lt1"/>
+          </a:fontRef>
+        </p:style>
+        <p:txBody>
+          <a:bodyPr rtlCol="0" anchor="ctr"/>
+          <a:lstStyle/>
+          <a:p>
+            <a:pPr algn="ctr"/>
+            <a:endParaRPr lang="en-GB"/>
+          </a:p>
+        </p:txBody>
+      </p:sp>
+      <p:sp>
+        <p:nvSpPr>
+          <p:cNvPr id="5" name="4 CuadroTexto"/>
+          <p:cNvSpPr txBox="1"/>
+          <p:nvPr/>
+        </p:nvSpPr>
+        <p:spPr>
+          <a:xfrm>
+            <a:off x="1301387" y="2764340"/>
+            <a:ext cx="2088232" cy="1477328"/>
+          </a:xfrm>
+          <a:prstGeom prst="rect">
+            <a:avLst/>
+          </a:prstGeom>
+          <a:noFill/>
+        </p:spPr>
+        <p:txBody>
+          <a:bodyPr wrap="square" rtlCol="0">
+            <a:spAutoFit/>
+          </a:bodyPr>
+          <a:lstStyle/>
+          <a:p>
+            <a:r>
+              <a:rPr lang="en-GB" dirty="0" smtClean="0">
+                <a:solidFill>
+                  <a:srgbClr val="00B050"/>
+                </a:solidFill>
+              </a:rPr>
+              <a:t>This group of property is shown only if the answer to the previous QUESTION is ‘No’</a:t>
+            </a:r>
+            <a:endParaRPr lang="en-GB" dirty="0">
+              <a:solidFill>
+                <a:srgbClr val="00B050"/>
+              </a:solidFill>
+            </a:endParaRPr>
+          </a:p>
+        </p:txBody>
+      </p:sp>
+      <p:cxnSp>
+        <p:nvCxnSpPr>
+          <p:cNvPr id="7" name="6 Conector recto de flecha"/>
+          <p:cNvCxnSpPr>
+            <a:stCxn id="5" idx="3"/>
+            <a:endCxn id="4" idx="1"/>
+          </p:cNvCxnSpPr>
+          <p:nvPr/>
+        </p:nvCxnSpPr>
+        <p:spPr>
+          <a:xfrm flipV="1">
+            <a:off x="3389619" y="3501008"/>
+            <a:ext cx="390293" cy="1996"/>
+          </a:xfrm>
+          <a:prstGeom prst="straightConnector1">
+            <a:avLst/>
+          </a:prstGeom>
+          <a:ln w="19050">
+            <a:solidFill>
+              <a:srgbClr val="92D050"/>
+            </a:solidFill>
+            <a:tailEnd type="arrow"/>
+          </a:ln>
+        </p:spPr>
+        <p:style>
+          <a:lnRef idx="1">
+            <a:schemeClr val="accent1"/>
+          </a:lnRef>
+          <a:fillRef idx="0">
+            <a:schemeClr val="accent1"/>
+          </a:fillRef>
+          <a:effectRef idx="0">
+            <a:schemeClr val="accent1"/>
+          </a:effectRef>
+          <a:fontRef idx="minor">
+            <a:schemeClr val="tx1"/>
+          </a:fontRef>
+        </p:style>
+      </p:cxnSp>
+      <p:sp>
+        <p:nvSpPr>
+          <p:cNvPr id="6" name="5 Elipse"/>
+          <p:cNvSpPr/>
+          <p:nvPr/>
+        </p:nvSpPr>
+        <p:spPr>
+          <a:xfrm>
+            <a:off x="8820472" y="1374179"/>
+            <a:ext cx="237681" cy="223557"/>
+          </a:xfrm>
+          <a:prstGeom prst="ellipse">
+            <a:avLst/>
+          </a:prstGeom>
+          <a:solidFill>
+            <a:srgbClr val="0070C0"/>
+          </a:solidFill>
+          <a:ln>
+            <a:noFill/>
+          </a:ln>
+        </p:spPr>
+        <p:style>
+          <a:lnRef idx="2">
+            <a:schemeClr val="accent1">
+              <a:shade val="50000"/>
+            </a:schemeClr>
+          </a:lnRef>
+          <a:fillRef idx="1">
+            <a:schemeClr val="accent1"/>
+          </a:fillRef>
+          <a:effectRef idx="0">
+            <a:schemeClr val="accent1"/>
+          </a:effectRef>
+          <a:fontRef idx="minor">
+            <a:schemeClr val="lt1"/>
+          </a:fontRef>
+        </p:style>
+        <p:txBody>
+          <a:bodyPr rtlCol="0" anchor="ctr"/>
+          <a:lstStyle/>
+          <a:p>
+            <a:pPr algn="ctr"/>
+            <a:r>
+              <a:rPr lang="en-GB" sz="1200" dirty="0" smtClean="0"/>
+              <a:t>1</a:t>
+            </a:r>
+            <a:endParaRPr lang="en-GB" sz="1200" dirty="0"/>
+          </a:p>
+        </p:txBody>
+      </p:sp>
+      <p:sp>
+        <p:nvSpPr>
+          <p:cNvPr id="8" name="7 Elipse"/>
+          <p:cNvSpPr/>
+          <p:nvPr/>
+        </p:nvSpPr>
+        <p:spPr>
+          <a:xfrm>
+            <a:off x="8820472" y="1852000"/>
+            <a:ext cx="237681" cy="223557"/>
+          </a:xfrm>
+          <a:prstGeom prst="ellipse">
+            <a:avLst/>
+          </a:prstGeom>
+          <a:solidFill>
+            <a:srgbClr val="0070C0"/>
+          </a:solidFill>
+          <a:ln>
+            <a:noFill/>
+          </a:ln>
+        </p:spPr>
+        <p:style>
+          <a:lnRef idx="2">
+            <a:schemeClr val="accent1">
+              <a:shade val="50000"/>
+            </a:schemeClr>
+          </a:lnRef>
+          <a:fillRef idx="1">
+            <a:schemeClr val="accent1"/>
+          </a:fillRef>
+          <a:effectRef idx="0">
+            <a:schemeClr val="accent1"/>
+          </a:effectRef>
+          <a:fontRef idx="minor">
+            <a:schemeClr val="lt1"/>
+          </a:fontRef>
+        </p:style>
+        <p:txBody>
+          <a:bodyPr rtlCol="0" anchor="ctr"/>
+          <a:lstStyle/>
+          <a:p>
+            <a:pPr algn="ctr"/>
+            <a:r>
+              <a:rPr lang="en-GB" sz="1200" dirty="0"/>
+              <a:t>3</a:t>
+            </a:r>
+          </a:p>
+        </p:txBody>
+      </p:sp>
+      <p:sp>
+        <p:nvSpPr>
+          <p:cNvPr id="9" name="8 Elipse"/>
+          <p:cNvSpPr/>
+          <p:nvPr/>
+        </p:nvSpPr>
+        <p:spPr>
+          <a:xfrm>
+            <a:off x="8820472" y="3205443"/>
+            <a:ext cx="237681" cy="223557"/>
+          </a:xfrm>
+          <a:prstGeom prst="ellipse">
+            <a:avLst/>
+          </a:prstGeom>
+          <a:solidFill>
+            <a:srgbClr val="0070C0"/>
+          </a:solidFill>
+          <a:ln>
+            <a:noFill/>
+          </a:ln>
+        </p:spPr>
+        <p:style>
+          <a:lnRef idx="2">
+            <a:schemeClr val="accent1">
+              <a:shade val="50000"/>
+            </a:schemeClr>
+          </a:lnRef>
+          <a:fillRef idx="1">
+            <a:schemeClr val="accent1"/>
+          </a:fillRef>
+          <a:effectRef idx="0">
+            <a:schemeClr val="accent1"/>
+          </a:effectRef>
+          <a:fontRef idx="minor">
+            <a:schemeClr val="lt1"/>
+          </a:fontRef>
+        </p:style>
+        <p:txBody>
+          <a:bodyPr rtlCol="0" anchor="ctr"/>
+          <a:lstStyle/>
+          <a:p>
+            <a:pPr algn="ctr"/>
+            <a:r>
+              <a:rPr lang="en-GB" sz="1200" dirty="0"/>
+              <a:t>4</a:t>
+            </a:r>
+          </a:p>
+        </p:txBody>
+      </p:sp>
+      <p:sp>
+        <p:nvSpPr>
+          <p:cNvPr id="10" name="9 Elipse"/>
+          <p:cNvSpPr/>
+          <p:nvPr/>
+        </p:nvSpPr>
+        <p:spPr>
+          <a:xfrm>
+            <a:off x="8820472" y="3645024"/>
+            <a:ext cx="237681" cy="223557"/>
+          </a:xfrm>
+          <a:prstGeom prst="ellipse">
+            <a:avLst/>
+          </a:prstGeom>
+          <a:solidFill>
+            <a:srgbClr val="0070C0"/>
+          </a:solidFill>
+          <a:ln>
+            <a:noFill/>
+          </a:ln>
+        </p:spPr>
+        <p:style>
+          <a:lnRef idx="2">
+            <a:schemeClr val="accent1">
+              <a:shade val="50000"/>
+            </a:schemeClr>
+          </a:lnRef>
+          <a:fillRef idx="1">
+            <a:schemeClr val="accent1"/>
+          </a:fillRef>
+          <a:effectRef idx="0">
+            <a:schemeClr val="accent1"/>
+          </a:effectRef>
+          <a:fontRef idx="minor">
+            <a:schemeClr val="lt1"/>
+          </a:fontRef>
+        </p:style>
+        <p:txBody>
+          <a:bodyPr rtlCol="0" anchor="ctr"/>
+          <a:lstStyle/>
+          <a:p>
+            <a:pPr algn="ctr"/>
+            <a:r>
+              <a:rPr lang="en-GB" sz="1200" dirty="0"/>
+              <a:t>5</a:t>
+            </a:r>
+          </a:p>
+        </p:txBody>
+      </p:sp>
+      <p:sp>
+        <p:nvSpPr>
+          <p:cNvPr id="11" name="10 Elipse"/>
+          <p:cNvSpPr/>
+          <p:nvPr/>
+        </p:nvSpPr>
+        <p:spPr>
+          <a:xfrm>
+            <a:off x="8820472" y="4896456"/>
+            <a:ext cx="237681" cy="223557"/>
+          </a:xfrm>
+          <a:prstGeom prst="ellipse">
+            <a:avLst/>
+          </a:prstGeom>
+          <a:solidFill>
+            <a:srgbClr val="0070C0"/>
+          </a:solidFill>
+          <a:ln>
+            <a:noFill/>
+          </a:ln>
+        </p:spPr>
+        <p:style>
+          <a:lnRef idx="2">
+            <a:schemeClr val="accent1">
+              <a:shade val="50000"/>
+            </a:schemeClr>
+          </a:lnRef>
+          <a:fillRef idx="1">
+            <a:schemeClr val="accent1"/>
+          </a:fillRef>
+          <a:effectRef idx="0">
+            <a:schemeClr val="accent1"/>
+          </a:effectRef>
+          <a:fontRef idx="minor">
+            <a:schemeClr val="lt1"/>
+          </a:fontRef>
+        </p:style>
+        <p:txBody>
+          <a:bodyPr rtlCol="0" anchor="ctr"/>
+          <a:lstStyle/>
+          <a:p>
+            <a:pPr algn="ctr"/>
+            <a:r>
+              <a:rPr lang="en-GB" sz="1200" dirty="0"/>
+              <a:t>6</a:t>
+            </a:r>
+          </a:p>
+        </p:txBody>
+      </p:sp>
+      <p:sp>
+        <p:nvSpPr>
+          <p:cNvPr id="12" name="11 Elipse"/>
+          <p:cNvSpPr/>
+          <p:nvPr/>
+        </p:nvSpPr>
+        <p:spPr>
+          <a:xfrm>
+            <a:off x="8820472" y="5273909"/>
+            <a:ext cx="237681" cy="223557"/>
+          </a:xfrm>
+          <a:prstGeom prst="ellipse">
+            <a:avLst/>
+          </a:prstGeom>
+          <a:solidFill>
+            <a:srgbClr val="0070C0"/>
+          </a:solidFill>
+          <a:ln>
+            <a:noFill/>
+          </a:ln>
+        </p:spPr>
+        <p:style>
+          <a:lnRef idx="2">
+            <a:schemeClr val="accent1">
+              <a:shade val="50000"/>
+            </a:schemeClr>
+          </a:lnRef>
+          <a:fillRef idx="1">
+            <a:schemeClr val="accent1"/>
+          </a:fillRef>
+          <a:effectRef idx="0">
+            <a:schemeClr val="accent1"/>
+          </a:effectRef>
+          <a:fontRef idx="minor">
+            <a:schemeClr val="lt1"/>
+          </a:fontRef>
+        </p:style>
+        <p:txBody>
+          <a:bodyPr rtlCol="0" anchor="ctr"/>
+          <a:lstStyle/>
+          <a:p>
+            <a:pPr algn="ctr"/>
+            <a:r>
+              <a:rPr lang="en-GB" sz="1200" dirty="0" smtClean="0"/>
+              <a:t>7</a:t>
+            </a:r>
+            <a:endParaRPr lang="en-GB" sz="1200" dirty="0"/>
+          </a:p>
+        </p:txBody>
+      </p:sp>
+      <p:sp>
+        <p:nvSpPr>
+          <p:cNvPr id="13" name="12 Elipse"/>
+          <p:cNvSpPr/>
+          <p:nvPr/>
+        </p:nvSpPr>
+        <p:spPr>
+          <a:xfrm>
+            <a:off x="8820472" y="5647597"/>
+            <a:ext cx="237681" cy="223557"/>
+          </a:xfrm>
+          <a:prstGeom prst="ellipse">
+            <a:avLst/>
+          </a:prstGeom>
+          <a:solidFill>
+            <a:srgbClr val="0070C0"/>
+          </a:solidFill>
+          <a:ln>
+            <a:noFill/>
+          </a:ln>
+        </p:spPr>
+        <p:style>
+          <a:lnRef idx="2">
+            <a:schemeClr val="accent1">
+              <a:shade val="50000"/>
+            </a:schemeClr>
+          </a:lnRef>
+          <a:fillRef idx="1">
+            <a:schemeClr val="accent1"/>
+          </a:fillRef>
+          <a:effectRef idx="0">
+            <a:schemeClr val="accent1"/>
+          </a:effectRef>
+          <a:fontRef idx="minor">
+            <a:schemeClr val="lt1"/>
+          </a:fontRef>
+        </p:style>
+        <p:txBody>
+          <a:bodyPr rtlCol="0" anchor="ctr"/>
+          <a:lstStyle/>
+          <a:p>
+            <a:pPr algn="ctr"/>
+            <a:r>
+              <a:rPr lang="en-GB" sz="1200" dirty="0" smtClean="0"/>
+              <a:t>8</a:t>
+            </a:r>
+            <a:endParaRPr lang="en-GB" sz="1200" dirty="0"/>
+          </a:p>
+        </p:txBody>
+      </p:sp>
+      <p:sp>
+        <p:nvSpPr>
+          <p:cNvPr id="14" name="13 Elipse"/>
+          <p:cNvSpPr/>
+          <p:nvPr/>
+        </p:nvSpPr>
+        <p:spPr>
+          <a:xfrm>
+            <a:off x="7411376" y="1837291"/>
+            <a:ext cx="237681" cy="223557"/>
+          </a:xfrm>
+          <a:prstGeom prst="ellipse">
+            <a:avLst/>
+          </a:prstGeom>
+          <a:solidFill>
+            <a:srgbClr val="0070C0"/>
+          </a:solidFill>
+          <a:ln>
+            <a:noFill/>
+          </a:ln>
+        </p:spPr>
+        <p:style>
+          <a:lnRef idx="2">
+            <a:schemeClr val="accent1">
+              <a:shade val="50000"/>
+            </a:schemeClr>
+          </a:lnRef>
+          <a:fillRef idx="1">
+            <a:schemeClr val="accent1"/>
+          </a:fillRef>
+          <a:effectRef idx="0">
+            <a:schemeClr val="accent1"/>
+          </a:effectRef>
+          <a:fontRef idx="minor">
+            <a:schemeClr val="lt1"/>
+          </a:fontRef>
+        </p:style>
+        <p:txBody>
+          <a:bodyPr rtlCol="0" anchor="ctr"/>
+          <a:lstStyle/>
+          <a:p>
+            <a:pPr algn="ctr"/>
+            <a:r>
+              <a:rPr lang="en-GB" sz="1200" dirty="0" smtClean="0"/>
+              <a:t>2</a:t>
+            </a:r>
+            <a:endParaRPr lang="en-GB" sz="1200" dirty="0"/>
+          </a:p>
+        </p:txBody>
+      </p:sp>
     </p:spTree>
     <p:extLst>
       <p:ext uri="{BB962C8B-B14F-4D97-AF65-F5344CB8AC3E}">

</xml_diff>